<commit_message>
Update ASPE Student challenge mounting provisions for the Z.pptx
</commit_message>
<xml_diff>
--- a/CAD/ASPE Student challenge mounting provisions for the Z.pptx
+++ b/CAD/ASPE Student challenge mounting provisions for the Z.pptx
@@ -4,16 +4,11 @@
   <p:sldMasterIdLst>
     <p:sldMasterId id="2147483648" r:id="rId1"/>
   </p:sldMasterIdLst>
-  <p:notesMasterIdLst>
-    <p:notesMasterId r:id="rId8"/>
-  </p:notesMasterIdLst>
   <p:sldIdLst>
-    <p:sldId id="256" r:id="rId2"/>
-    <p:sldId id="257" r:id="rId3"/>
+    <p:sldId id="257" r:id="rId2"/>
+    <p:sldId id="258" r:id="rId3"/>
     <p:sldId id="259" r:id="rId4"/>
-    <p:sldId id="258" r:id="rId5"/>
-    <p:sldId id="260" r:id="rId6"/>
-    <p:sldId id="261" r:id="rId7"/>
+    <p:sldId id="260" r:id="rId5"/>
   </p:sldIdLst>
   <p:sldSz cx="12192000" cy="6858000"/>
   <p:notesSz cx="6858000" cy="9144000"/>
@@ -120,355 +115,6 @@
 </p:presentation>
 </file>
 
-<file path=ppt/notesMasters/notesMaster1.xml><?xml version="1.0" encoding="utf-8"?>
-<p:notesMaster xmlns:a="http://schemas.openxmlformats.org/drawingml/2006/main" xmlns:r="http://schemas.openxmlformats.org/officeDocument/2006/relationships" xmlns:p="http://schemas.openxmlformats.org/presentationml/2006/main">
-  <p:cSld>
-    <p:bg>
-      <p:bgRef idx="1001">
-        <a:schemeClr val="bg1"/>
-      </p:bgRef>
-    </p:bg>
-    <p:spTree>
-      <p:nvGrpSpPr>
-        <p:cNvPr id="1" name=""/>
-        <p:cNvGrpSpPr/>
-        <p:nvPr/>
-      </p:nvGrpSpPr>
-      <p:grpSpPr>
-        <a:xfrm>
-          <a:off x="0" y="0"/>
-          <a:ext cx="0" cy="0"/>
-          <a:chOff x="0" y="0"/>
-          <a:chExt cx="0" cy="0"/>
-        </a:xfrm>
-      </p:grpSpPr>
-      <p:sp>
-        <p:nvSpPr>
-          <p:cNvPr id="2" name="Header Placeholder 1"/>
-          <p:cNvSpPr>
-            <a:spLocks noGrp="1"/>
-          </p:cNvSpPr>
-          <p:nvPr>
-            <p:ph type="hdr" sz="quarter"/>
-          </p:nvPr>
-        </p:nvSpPr>
-        <p:spPr>
-          <a:xfrm>
-            <a:off x="0" y="0"/>
-            <a:ext cx="2971800" cy="458788"/>
-          </a:xfrm>
-          <a:prstGeom prst="rect">
-            <a:avLst/>
-          </a:prstGeom>
-        </p:spPr>
-        <p:txBody>
-          <a:bodyPr vert="horz" lIns="91440" tIns="45720" rIns="91440" bIns="45720" rtlCol="0"/>
-          <a:lstStyle>
-            <a:lvl1pPr algn="l">
-              <a:defRPr sz="1200"/>
-            </a:lvl1pPr>
-          </a:lstStyle>
-          <a:p>
-            <a:endParaRPr lang="en-US"/>
-          </a:p>
-        </p:txBody>
-      </p:sp>
-      <p:sp>
-        <p:nvSpPr>
-          <p:cNvPr id="3" name="Date Placeholder 2"/>
-          <p:cNvSpPr>
-            <a:spLocks noGrp="1"/>
-          </p:cNvSpPr>
-          <p:nvPr>
-            <p:ph type="dt" idx="1"/>
-          </p:nvPr>
-        </p:nvSpPr>
-        <p:spPr>
-          <a:xfrm>
-            <a:off x="3884613" y="0"/>
-            <a:ext cx="2971800" cy="458788"/>
-          </a:xfrm>
-          <a:prstGeom prst="rect">
-            <a:avLst/>
-          </a:prstGeom>
-        </p:spPr>
-        <p:txBody>
-          <a:bodyPr vert="horz" lIns="91440" tIns="45720" rIns="91440" bIns="45720" rtlCol="0"/>
-          <a:lstStyle>
-            <a:lvl1pPr algn="r">
-              <a:defRPr sz="1200"/>
-            </a:lvl1pPr>
-          </a:lstStyle>
-          <a:p>
-            <a:fld id="{98FC08BC-DE65-4C07-8E6E-050ECB47BE30}" type="datetimeFigureOut">
-              <a:rPr lang="en-US" smtClean="0"/>
-              <a:t>8/21/2020</a:t>
-            </a:fld>
-            <a:endParaRPr lang="en-US"/>
-          </a:p>
-        </p:txBody>
-      </p:sp>
-      <p:sp>
-        <p:nvSpPr>
-          <p:cNvPr id="4" name="Slide Image Placeholder 3"/>
-          <p:cNvSpPr>
-            <a:spLocks noGrp="1" noRot="1" noChangeAspect="1"/>
-          </p:cNvSpPr>
-          <p:nvPr>
-            <p:ph type="sldImg" idx="2"/>
-          </p:nvPr>
-        </p:nvSpPr>
-        <p:spPr>
-          <a:xfrm>
-            <a:off x="685800" y="1143000"/>
-            <a:ext cx="5486400" cy="3086100"/>
-          </a:xfrm>
-          <a:prstGeom prst="rect">
-            <a:avLst/>
-          </a:prstGeom>
-          <a:noFill/>
-          <a:ln w="12700">
-            <a:solidFill>
-              <a:prstClr val="black"/>
-            </a:solidFill>
-          </a:ln>
-        </p:spPr>
-        <p:txBody>
-          <a:bodyPr vert="horz" lIns="91440" tIns="45720" rIns="91440" bIns="45720" rtlCol="0" anchor="ctr"/>
-          <a:lstStyle/>
-          <a:p>
-            <a:endParaRPr lang="en-US"/>
-          </a:p>
-        </p:txBody>
-      </p:sp>
-      <p:sp>
-        <p:nvSpPr>
-          <p:cNvPr id="5" name="Notes Placeholder 4"/>
-          <p:cNvSpPr>
-            <a:spLocks noGrp="1"/>
-          </p:cNvSpPr>
-          <p:nvPr>
-            <p:ph type="body" sz="quarter" idx="3"/>
-          </p:nvPr>
-        </p:nvSpPr>
-        <p:spPr>
-          <a:xfrm>
-            <a:off x="685800" y="4400550"/>
-            <a:ext cx="5486400" cy="3600450"/>
-          </a:xfrm>
-          <a:prstGeom prst="rect">
-            <a:avLst/>
-          </a:prstGeom>
-        </p:spPr>
-        <p:txBody>
-          <a:bodyPr vert="horz" lIns="91440" tIns="45720" rIns="91440" bIns="45720" rtlCol="0"/>
-          <a:lstStyle/>
-          <a:p>
-            <a:pPr lvl="0"/>
-            <a:r>
-              <a:rPr lang="en-US"/>
-              <a:t>Click to edit Master text styles</a:t>
-            </a:r>
-          </a:p>
-          <a:p>
-            <a:pPr lvl="1"/>
-            <a:r>
-              <a:rPr lang="en-US"/>
-              <a:t>Second level</a:t>
-            </a:r>
-          </a:p>
-          <a:p>
-            <a:pPr lvl="2"/>
-            <a:r>
-              <a:rPr lang="en-US"/>
-              <a:t>Third level</a:t>
-            </a:r>
-          </a:p>
-          <a:p>
-            <a:pPr lvl="3"/>
-            <a:r>
-              <a:rPr lang="en-US"/>
-              <a:t>Fourth level</a:t>
-            </a:r>
-          </a:p>
-          <a:p>
-            <a:pPr lvl="4"/>
-            <a:r>
-              <a:rPr lang="en-US"/>
-              <a:t>Fifth level</a:t>
-            </a:r>
-          </a:p>
-        </p:txBody>
-      </p:sp>
-      <p:sp>
-        <p:nvSpPr>
-          <p:cNvPr id="6" name="Footer Placeholder 5"/>
-          <p:cNvSpPr>
-            <a:spLocks noGrp="1"/>
-          </p:cNvSpPr>
-          <p:nvPr>
-            <p:ph type="ftr" sz="quarter" idx="4"/>
-          </p:nvPr>
-        </p:nvSpPr>
-        <p:spPr>
-          <a:xfrm>
-            <a:off x="0" y="8685213"/>
-            <a:ext cx="2971800" cy="458787"/>
-          </a:xfrm>
-          <a:prstGeom prst="rect">
-            <a:avLst/>
-          </a:prstGeom>
-        </p:spPr>
-        <p:txBody>
-          <a:bodyPr vert="horz" lIns="91440" tIns="45720" rIns="91440" bIns="45720" rtlCol="0" anchor="b"/>
-          <a:lstStyle>
-            <a:lvl1pPr algn="l">
-              <a:defRPr sz="1200"/>
-            </a:lvl1pPr>
-          </a:lstStyle>
-          <a:p>
-            <a:endParaRPr lang="en-US"/>
-          </a:p>
-        </p:txBody>
-      </p:sp>
-      <p:sp>
-        <p:nvSpPr>
-          <p:cNvPr id="7" name="Slide Number Placeholder 6"/>
-          <p:cNvSpPr>
-            <a:spLocks noGrp="1"/>
-          </p:cNvSpPr>
-          <p:nvPr>
-            <p:ph type="sldNum" sz="quarter" idx="5"/>
-          </p:nvPr>
-        </p:nvSpPr>
-        <p:spPr>
-          <a:xfrm>
-            <a:off x="3884613" y="8685213"/>
-            <a:ext cx="2971800" cy="458787"/>
-          </a:xfrm>
-          <a:prstGeom prst="rect">
-            <a:avLst/>
-          </a:prstGeom>
-        </p:spPr>
-        <p:txBody>
-          <a:bodyPr vert="horz" lIns="91440" tIns="45720" rIns="91440" bIns="45720" rtlCol="0" anchor="b"/>
-          <a:lstStyle>
-            <a:lvl1pPr algn="r">
-              <a:defRPr sz="1200"/>
-            </a:lvl1pPr>
-          </a:lstStyle>
-          <a:p>
-            <a:fld id="{46510A6C-6F8D-49A2-AA36-029C357599BB}" type="slidenum">
-              <a:rPr lang="en-US" smtClean="0"/>
-              <a:t>‹#›</a:t>
-            </a:fld>
-            <a:endParaRPr lang="en-US"/>
-          </a:p>
-        </p:txBody>
-      </p:sp>
-    </p:spTree>
-    <p:extLst>
-      <p:ext uri="{BB962C8B-B14F-4D97-AF65-F5344CB8AC3E}">
-        <p14:creationId xmlns:p14="http://schemas.microsoft.com/office/powerpoint/2010/main" val="638736166"/>
-      </p:ext>
-    </p:extLst>
-  </p:cSld>
-  <p:clrMap bg1="lt1" tx1="dk1" bg2="lt2" tx2="dk2" accent1="accent1" accent2="accent2" accent3="accent3" accent4="accent4" accent5="accent5" accent6="accent6" hlink="hlink" folHlink="folHlink"/>
-  <p:notesStyle>
-    <a:lvl1pPr marL="0" algn="l" defTabSz="914400" rtl="0" eaLnBrk="1" latinLnBrk="0" hangingPunct="1">
-      <a:defRPr sz="1200" kern="1200">
-        <a:solidFill>
-          <a:schemeClr val="tx1"/>
-        </a:solidFill>
-        <a:latin typeface="+mn-lt"/>
-        <a:ea typeface="+mn-ea"/>
-        <a:cs typeface="+mn-cs"/>
-      </a:defRPr>
-    </a:lvl1pPr>
-    <a:lvl2pPr marL="457200" algn="l" defTabSz="914400" rtl="0" eaLnBrk="1" latinLnBrk="0" hangingPunct="1">
-      <a:defRPr sz="1200" kern="1200">
-        <a:solidFill>
-          <a:schemeClr val="tx1"/>
-        </a:solidFill>
-        <a:latin typeface="+mn-lt"/>
-        <a:ea typeface="+mn-ea"/>
-        <a:cs typeface="+mn-cs"/>
-      </a:defRPr>
-    </a:lvl2pPr>
-    <a:lvl3pPr marL="914400" algn="l" defTabSz="914400" rtl="0" eaLnBrk="1" latinLnBrk="0" hangingPunct="1">
-      <a:defRPr sz="1200" kern="1200">
-        <a:solidFill>
-          <a:schemeClr val="tx1"/>
-        </a:solidFill>
-        <a:latin typeface="+mn-lt"/>
-        <a:ea typeface="+mn-ea"/>
-        <a:cs typeface="+mn-cs"/>
-      </a:defRPr>
-    </a:lvl3pPr>
-    <a:lvl4pPr marL="1371600" algn="l" defTabSz="914400" rtl="0" eaLnBrk="1" latinLnBrk="0" hangingPunct="1">
-      <a:defRPr sz="1200" kern="1200">
-        <a:solidFill>
-          <a:schemeClr val="tx1"/>
-        </a:solidFill>
-        <a:latin typeface="+mn-lt"/>
-        <a:ea typeface="+mn-ea"/>
-        <a:cs typeface="+mn-cs"/>
-      </a:defRPr>
-    </a:lvl4pPr>
-    <a:lvl5pPr marL="1828800" algn="l" defTabSz="914400" rtl="0" eaLnBrk="1" latinLnBrk="0" hangingPunct="1">
-      <a:defRPr sz="1200" kern="1200">
-        <a:solidFill>
-          <a:schemeClr val="tx1"/>
-        </a:solidFill>
-        <a:latin typeface="+mn-lt"/>
-        <a:ea typeface="+mn-ea"/>
-        <a:cs typeface="+mn-cs"/>
-      </a:defRPr>
-    </a:lvl5pPr>
-    <a:lvl6pPr marL="2286000" algn="l" defTabSz="914400" rtl="0" eaLnBrk="1" latinLnBrk="0" hangingPunct="1">
-      <a:defRPr sz="1200" kern="1200">
-        <a:solidFill>
-          <a:schemeClr val="tx1"/>
-        </a:solidFill>
-        <a:latin typeface="+mn-lt"/>
-        <a:ea typeface="+mn-ea"/>
-        <a:cs typeface="+mn-cs"/>
-      </a:defRPr>
-    </a:lvl6pPr>
-    <a:lvl7pPr marL="2743200" algn="l" defTabSz="914400" rtl="0" eaLnBrk="1" latinLnBrk="0" hangingPunct="1">
-      <a:defRPr sz="1200" kern="1200">
-        <a:solidFill>
-          <a:schemeClr val="tx1"/>
-        </a:solidFill>
-        <a:latin typeface="+mn-lt"/>
-        <a:ea typeface="+mn-ea"/>
-        <a:cs typeface="+mn-cs"/>
-      </a:defRPr>
-    </a:lvl7pPr>
-    <a:lvl8pPr marL="3200400" algn="l" defTabSz="914400" rtl="0" eaLnBrk="1" latinLnBrk="0" hangingPunct="1">
-      <a:defRPr sz="1200" kern="1200">
-        <a:solidFill>
-          <a:schemeClr val="tx1"/>
-        </a:solidFill>
-        <a:latin typeface="+mn-lt"/>
-        <a:ea typeface="+mn-ea"/>
-        <a:cs typeface="+mn-cs"/>
-      </a:defRPr>
-    </a:lvl8pPr>
-    <a:lvl9pPr marL="3657600" algn="l" defTabSz="914400" rtl="0" eaLnBrk="1" latinLnBrk="0" hangingPunct="1">
-      <a:defRPr sz="1200" kern="1200">
-        <a:solidFill>
-          <a:schemeClr val="tx1"/>
-        </a:solidFill>
-        <a:latin typeface="+mn-lt"/>
-        <a:ea typeface="+mn-ea"/>
-        <a:cs typeface="+mn-cs"/>
-      </a:defRPr>
-    </a:lvl9pPr>
-  </p:notesStyle>
-</p:notesMaster>
-</file>
-
 <file path=ppt/slideLayouts/slideLayout1.xml><?xml version="1.0" encoding="utf-8"?>
 <p:sldLayout xmlns:a="http://schemas.openxmlformats.org/drawingml/2006/main" xmlns:r="http://schemas.openxmlformats.org/officeDocument/2006/relationships" xmlns:p="http://schemas.openxmlformats.org/presentationml/2006/main" type="title" preserve="1">
   <p:cSld name="Title Slide">
@@ -488,7 +134,13 @@
       </p:grpSpPr>
       <p:sp>
         <p:nvSpPr>
-          <p:cNvPr id="2" name="Title 1"/>
+          <p:cNvPr id="2" name="Title 1">
+            <a:extLst>
+              <a:ext uri="{FF2B5EF4-FFF2-40B4-BE49-F238E27FC236}">
+                <a16:creationId xmlns:a16="http://schemas.microsoft.com/office/drawing/2014/main" xmlns="" id="{C7FFC3EF-8DB9-430D-946F-74A7ED6F8BE7}"/>
+              </a:ext>
+            </a:extLst>
+          </p:cNvPr>
           <p:cNvSpPr>
             <a:spLocks noGrp="1"/>
           </p:cNvSpPr>
@@ -519,7 +171,13 @@
       </p:sp>
       <p:sp>
         <p:nvSpPr>
-          <p:cNvPr id="3" name="Subtitle 2"/>
+          <p:cNvPr id="3" name="Subtitle 2">
+            <a:extLst>
+              <a:ext uri="{FF2B5EF4-FFF2-40B4-BE49-F238E27FC236}">
+                <a16:creationId xmlns:a16="http://schemas.microsoft.com/office/drawing/2014/main" xmlns="" id="{7002861D-D0D1-4FA3-A41B-F95D6057C4B0}"/>
+              </a:ext>
+            </a:extLst>
+          </p:cNvPr>
           <p:cNvSpPr>
             <a:spLocks noGrp="1"/>
           </p:cNvSpPr>
@@ -583,7 +241,13 @@
       </p:sp>
       <p:sp>
         <p:nvSpPr>
-          <p:cNvPr id="4" name="Date Placeholder 3"/>
+          <p:cNvPr id="4" name="Date Placeholder 3">
+            <a:extLst>
+              <a:ext uri="{FF2B5EF4-FFF2-40B4-BE49-F238E27FC236}">
+                <a16:creationId xmlns:a16="http://schemas.microsoft.com/office/drawing/2014/main" xmlns="" id="{E17FAA6F-A02C-46E8-AF20-B4F3E711A48D}"/>
+              </a:ext>
+            </a:extLst>
+          </p:cNvPr>
           <p:cNvSpPr>
             <a:spLocks noGrp="1"/>
           </p:cNvSpPr>
@@ -596,9 +260,9 @@
           <a:bodyPr/>
           <a:lstStyle/>
           <a:p>
-            <a:fld id="{38FFCF3E-46D5-4218-A147-9F50AD6D9F61}" type="datetime1">
+            <a:fld id="{7CF88549-6791-4998-88F4-52B7B894EB4E}" type="datetimeFigureOut">
               <a:rPr lang="en-US" smtClean="0"/>
-              <a:t>8/21/2020</a:t>
+              <a:t>8/23/2020</a:t>
             </a:fld>
             <a:endParaRPr lang="en-US"/>
           </a:p>
@@ -606,7 +270,13 @@
       </p:sp>
       <p:sp>
         <p:nvSpPr>
-          <p:cNvPr id="5" name="Footer Placeholder 4"/>
+          <p:cNvPr id="5" name="Footer Placeholder 4">
+            <a:extLst>
+              <a:ext uri="{FF2B5EF4-FFF2-40B4-BE49-F238E27FC236}">
+                <a16:creationId xmlns:a16="http://schemas.microsoft.com/office/drawing/2014/main" xmlns="" id="{3B267958-994A-4031-B242-91F866A1C43B}"/>
+              </a:ext>
+            </a:extLst>
+          </p:cNvPr>
           <p:cNvSpPr>
             <a:spLocks noGrp="1"/>
           </p:cNvSpPr>
@@ -625,7 +295,13 @@
       </p:sp>
       <p:sp>
         <p:nvSpPr>
-          <p:cNvPr id="6" name="Slide Number Placeholder 5"/>
+          <p:cNvPr id="6" name="Slide Number Placeholder 5">
+            <a:extLst>
+              <a:ext uri="{FF2B5EF4-FFF2-40B4-BE49-F238E27FC236}">
+                <a16:creationId xmlns:a16="http://schemas.microsoft.com/office/drawing/2014/main" xmlns="" id="{F9F97087-7436-4D48-9F25-01815F2003AC}"/>
+              </a:ext>
+            </a:extLst>
+          </p:cNvPr>
           <p:cNvSpPr>
             <a:spLocks noGrp="1"/>
           </p:cNvSpPr>
@@ -638,7 +314,7 @@
           <a:bodyPr/>
           <a:lstStyle/>
           <a:p>
-            <a:fld id="{FD040B35-C2C8-4B03-A2C0-F0A6EF7C8A1A}" type="slidenum">
+            <a:fld id="{8059F3A2-05ED-4BC7-846E-86953A6B9462}" type="slidenum">
               <a:rPr lang="en-US" smtClean="0"/>
               <a:t>‹#›</a:t>
             </a:fld>
@@ -649,7 +325,7 @@
     </p:spTree>
     <p:extLst>
       <p:ext uri="{BB962C8B-B14F-4D97-AF65-F5344CB8AC3E}">
-        <p14:creationId xmlns:p14="http://schemas.microsoft.com/office/powerpoint/2010/main" val="3257210602"/>
+        <p14:creationId xmlns:p14="http://schemas.microsoft.com/office/powerpoint/2010/main" val="2645084905"/>
       </p:ext>
     </p:extLst>
   </p:cSld>
@@ -678,7 +354,13 @@
       </p:grpSpPr>
       <p:sp>
         <p:nvSpPr>
-          <p:cNvPr id="2" name="Title 1"/>
+          <p:cNvPr id="2" name="Title 1">
+            <a:extLst>
+              <a:ext uri="{FF2B5EF4-FFF2-40B4-BE49-F238E27FC236}">
+                <a16:creationId xmlns:a16="http://schemas.microsoft.com/office/drawing/2014/main" xmlns="" id="{8F5B11BA-83DF-44AD-9D03-2CD1406F6259}"/>
+              </a:ext>
+            </a:extLst>
+          </p:cNvPr>
           <p:cNvSpPr>
             <a:spLocks noGrp="1"/>
           </p:cNvSpPr>
@@ -700,7 +382,13 @@
       </p:sp>
       <p:sp>
         <p:nvSpPr>
-          <p:cNvPr id="3" name="Vertical Text Placeholder 2"/>
+          <p:cNvPr id="3" name="Vertical Text Placeholder 2">
+            <a:extLst>
+              <a:ext uri="{FF2B5EF4-FFF2-40B4-BE49-F238E27FC236}">
+                <a16:creationId xmlns:a16="http://schemas.microsoft.com/office/drawing/2014/main" xmlns="" id="{0D45A227-DBA1-452A-A810-554D9DEF4329}"/>
+              </a:ext>
+            </a:extLst>
+          </p:cNvPr>
           <p:cNvSpPr>
             <a:spLocks noGrp="1"/>
           </p:cNvSpPr>
@@ -751,7 +439,13 @@
       </p:sp>
       <p:sp>
         <p:nvSpPr>
-          <p:cNvPr id="4" name="Date Placeholder 3"/>
+          <p:cNvPr id="4" name="Date Placeholder 3">
+            <a:extLst>
+              <a:ext uri="{FF2B5EF4-FFF2-40B4-BE49-F238E27FC236}">
+                <a16:creationId xmlns:a16="http://schemas.microsoft.com/office/drawing/2014/main" xmlns="" id="{B5B69272-4641-4395-8396-32AF5C39AFCB}"/>
+              </a:ext>
+            </a:extLst>
+          </p:cNvPr>
           <p:cNvSpPr>
             <a:spLocks noGrp="1"/>
           </p:cNvSpPr>
@@ -764,9 +458,9 @@
           <a:bodyPr/>
           <a:lstStyle/>
           <a:p>
-            <a:fld id="{ABC7030C-6895-4E60-AE5A-B99A71092C9F}" type="datetime1">
+            <a:fld id="{7CF88549-6791-4998-88F4-52B7B894EB4E}" type="datetimeFigureOut">
               <a:rPr lang="en-US" smtClean="0"/>
-              <a:t>8/21/2020</a:t>
+              <a:t>8/23/2020</a:t>
             </a:fld>
             <a:endParaRPr lang="en-US"/>
           </a:p>
@@ -774,7 +468,13 @@
       </p:sp>
       <p:sp>
         <p:nvSpPr>
-          <p:cNvPr id="5" name="Footer Placeholder 4"/>
+          <p:cNvPr id="5" name="Footer Placeholder 4">
+            <a:extLst>
+              <a:ext uri="{FF2B5EF4-FFF2-40B4-BE49-F238E27FC236}">
+                <a16:creationId xmlns:a16="http://schemas.microsoft.com/office/drawing/2014/main" xmlns="" id="{1F0D5518-A06E-4E15-B3B1-C3D485C4B01D}"/>
+              </a:ext>
+            </a:extLst>
+          </p:cNvPr>
           <p:cNvSpPr>
             <a:spLocks noGrp="1"/>
           </p:cNvSpPr>
@@ -793,7 +493,13 @@
       </p:sp>
       <p:sp>
         <p:nvSpPr>
-          <p:cNvPr id="6" name="Slide Number Placeholder 5"/>
+          <p:cNvPr id="6" name="Slide Number Placeholder 5">
+            <a:extLst>
+              <a:ext uri="{FF2B5EF4-FFF2-40B4-BE49-F238E27FC236}">
+                <a16:creationId xmlns:a16="http://schemas.microsoft.com/office/drawing/2014/main" xmlns="" id="{E933FE95-2A95-4C54-8ECF-63C7731C91D5}"/>
+              </a:ext>
+            </a:extLst>
+          </p:cNvPr>
           <p:cNvSpPr>
             <a:spLocks noGrp="1"/>
           </p:cNvSpPr>
@@ -806,7 +512,7 @@
           <a:bodyPr/>
           <a:lstStyle/>
           <a:p>
-            <a:fld id="{FD040B35-C2C8-4B03-A2C0-F0A6EF7C8A1A}" type="slidenum">
+            <a:fld id="{8059F3A2-05ED-4BC7-846E-86953A6B9462}" type="slidenum">
               <a:rPr lang="en-US" smtClean="0"/>
               <a:t>‹#›</a:t>
             </a:fld>
@@ -817,7 +523,7 @@
     </p:spTree>
     <p:extLst>
       <p:ext uri="{BB962C8B-B14F-4D97-AF65-F5344CB8AC3E}">
-        <p14:creationId xmlns:p14="http://schemas.microsoft.com/office/powerpoint/2010/main" val="2482468506"/>
+        <p14:creationId xmlns:p14="http://schemas.microsoft.com/office/powerpoint/2010/main" val="3833267308"/>
       </p:ext>
     </p:extLst>
   </p:cSld>
@@ -846,7 +552,13 @@
       </p:grpSpPr>
       <p:sp>
         <p:nvSpPr>
-          <p:cNvPr id="2" name="Vertical Title 1"/>
+          <p:cNvPr id="2" name="Vertical Title 1">
+            <a:extLst>
+              <a:ext uri="{FF2B5EF4-FFF2-40B4-BE49-F238E27FC236}">
+                <a16:creationId xmlns:a16="http://schemas.microsoft.com/office/drawing/2014/main" xmlns="" id="{AABA9430-A107-4AEE-9A91-AEC291111E6D}"/>
+              </a:ext>
+            </a:extLst>
+          </p:cNvPr>
           <p:cNvSpPr>
             <a:spLocks noGrp="1"/>
           </p:cNvSpPr>
@@ -873,7 +585,13 @@
       </p:sp>
       <p:sp>
         <p:nvSpPr>
-          <p:cNvPr id="3" name="Vertical Text Placeholder 2"/>
+          <p:cNvPr id="3" name="Vertical Text Placeholder 2">
+            <a:extLst>
+              <a:ext uri="{FF2B5EF4-FFF2-40B4-BE49-F238E27FC236}">
+                <a16:creationId xmlns:a16="http://schemas.microsoft.com/office/drawing/2014/main" xmlns="" id="{5D109E29-80DA-409F-88D2-F360E000DA65}"/>
+              </a:ext>
+            </a:extLst>
+          </p:cNvPr>
           <p:cNvSpPr>
             <a:spLocks noGrp="1"/>
           </p:cNvSpPr>
@@ -929,7 +647,13 @@
       </p:sp>
       <p:sp>
         <p:nvSpPr>
-          <p:cNvPr id="4" name="Date Placeholder 3"/>
+          <p:cNvPr id="4" name="Date Placeholder 3">
+            <a:extLst>
+              <a:ext uri="{FF2B5EF4-FFF2-40B4-BE49-F238E27FC236}">
+                <a16:creationId xmlns:a16="http://schemas.microsoft.com/office/drawing/2014/main" xmlns="" id="{A7500640-ACEF-4E0E-8833-0AF718B0DAA3}"/>
+              </a:ext>
+            </a:extLst>
+          </p:cNvPr>
           <p:cNvSpPr>
             <a:spLocks noGrp="1"/>
           </p:cNvSpPr>
@@ -942,9 +666,9 @@
           <a:bodyPr/>
           <a:lstStyle/>
           <a:p>
-            <a:fld id="{D250EBB6-A004-4F10-8BE0-B75EA731C45A}" type="datetime1">
+            <a:fld id="{7CF88549-6791-4998-88F4-52B7B894EB4E}" type="datetimeFigureOut">
               <a:rPr lang="en-US" smtClean="0"/>
-              <a:t>8/21/2020</a:t>
+              <a:t>8/23/2020</a:t>
             </a:fld>
             <a:endParaRPr lang="en-US"/>
           </a:p>
@@ -952,7 +676,13 @@
       </p:sp>
       <p:sp>
         <p:nvSpPr>
-          <p:cNvPr id="5" name="Footer Placeholder 4"/>
+          <p:cNvPr id="5" name="Footer Placeholder 4">
+            <a:extLst>
+              <a:ext uri="{FF2B5EF4-FFF2-40B4-BE49-F238E27FC236}">
+                <a16:creationId xmlns:a16="http://schemas.microsoft.com/office/drawing/2014/main" xmlns="" id="{58089F33-DC8E-41FA-AADE-FFAA42D1D3B7}"/>
+              </a:ext>
+            </a:extLst>
+          </p:cNvPr>
           <p:cNvSpPr>
             <a:spLocks noGrp="1"/>
           </p:cNvSpPr>
@@ -971,7 +701,13 @@
       </p:sp>
       <p:sp>
         <p:nvSpPr>
-          <p:cNvPr id="6" name="Slide Number Placeholder 5"/>
+          <p:cNvPr id="6" name="Slide Number Placeholder 5">
+            <a:extLst>
+              <a:ext uri="{FF2B5EF4-FFF2-40B4-BE49-F238E27FC236}">
+                <a16:creationId xmlns:a16="http://schemas.microsoft.com/office/drawing/2014/main" xmlns="" id="{84E65331-0222-44F2-B37C-99E32F1812E5}"/>
+              </a:ext>
+            </a:extLst>
+          </p:cNvPr>
           <p:cNvSpPr>
             <a:spLocks noGrp="1"/>
           </p:cNvSpPr>
@@ -984,7 +720,7 @@
           <a:bodyPr/>
           <a:lstStyle/>
           <a:p>
-            <a:fld id="{FD040B35-C2C8-4B03-A2C0-F0A6EF7C8A1A}" type="slidenum">
+            <a:fld id="{8059F3A2-05ED-4BC7-846E-86953A6B9462}" type="slidenum">
               <a:rPr lang="en-US" smtClean="0"/>
               <a:t>‹#›</a:t>
             </a:fld>
@@ -995,7 +731,7 @@
     </p:spTree>
     <p:extLst>
       <p:ext uri="{BB962C8B-B14F-4D97-AF65-F5344CB8AC3E}">
-        <p14:creationId xmlns:p14="http://schemas.microsoft.com/office/powerpoint/2010/main" val="4245996290"/>
+        <p14:creationId xmlns:p14="http://schemas.microsoft.com/office/powerpoint/2010/main" val="532059404"/>
       </p:ext>
     </p:extLst>
   </p:cSld>
@@ -1024,7 +760,13 @@
       </p:grpSpPr>
       <p:sp>
         <p:nvSpPr>
-          <p:cNvPr id="2" name="Title 1"/>
+          <p:cNvPr id="2" name="Title 1">
+            <a:extLst>
+              <a:ext uri="{FF2B5EF4-FFF2-40B4-BE49-F238E27FC236}">
+                <a16:creationId xmlns:a16="http://schemas.microsoft.com/office/drawing/2014/main" xmlns="" id="{FDF841A5-322E-4F74-8A18-4F7F5FA49F2C}"/>
+              </a:ext>
+            </a:extLst>
+          </p:cNvPr>
           <p:cNvSpPr>
             <a:spLocks noGrp="1"/>
           </p:cNvSpPr>
@@ -1046,7 +788,13 @@
       </p:sp>
       <p:sp>
         <p:nvSpPr>
-          <p:cNvPr id="3" name="Content Placeholder 2"/>
+          <p:cNvPr id="3" name="Content Placeholder 2">
+            <a:extLst>
+              <a:ext uri="{FF2B5EF4-FFF2-40B4-BE49-F238E27FC236}">
+                <a16:creationId xmlns:a16="http://schemas.microsoft.com/office/drawing/2014/main" xmlns="" id="{47CC8657-60C2-40A2-8B48-650156AACD76}"/>
+              </a:ext>
+            </a:extLst>
+          </p:cNvPr>
           <p:cNvSpPr>
             <a:spLocks noGrp="1"/>
           </p:cNvSpPr>
@@ -1097,7 +845,13 @@
       </p:sp>
       <p:sp>
         <p:nvSpPr>
-          <p:cNvPr id="4" name="Date Placeholder 3"/>
+          <p:cNvPr id="4" name="Date Placeholder 3">
+            <a:extLst>
+              <a:ext uri="{FF2B5EF4-FFF2-40B4-BE49-F238E27FC236}">
+                <a16:creationId xmlns:a16="http://schemas.microsoft.com/office/drawing/2014/main" xmlns="" id="{2047625B-A909-47C2-A7F1-0818FD98BC17}"/>
+              </a:ext>
+            </a:extLst>
+          </p:cNvPr>
           <p:cNvSpPr>
             <a:spLocks noGrp="1"/>
           </p:cNvSpPr>
@@ -1110,9 +864,9 @@
           <a:bodyPr/>
           <a:lstStyle/>
           <a:p>
-            <a:fld id="{F7E8CD4F-2721-452C-8B25-261F4BDDC28D}" type="datetime1">
+            <a:fld id="{7CF88549-6791-4998-88F4-52B7B894EB4E}" type="datetimeFigureOut">
               <a:rPr lang="en-US" smtClean="0"/>
-              <a:t>8/21/2020</a:t>
+              <a:t>8/23/2020</a:t>
             </a:fld>
             <a:endParaRPr lang="en-US"/>
           </a:p>
@@ -1120,7 +874,13 @@
       </p:sp>
       <p:sp>
         <p:nvSpPr>
-          <p:cNvPr id="5" name="Footer Placeholder 4"/>
+          <p:cNvPr id="5" name="Footer Placeholder 4">
+            <a:extLst>
+              <a:ext uri="{FF2B5EF4-FFF2-40B4-BE49-F238E27FC236}">
+                <a16:creationId xmlns:a16="http://schemas.microsoft.com/office/drawing/2014/main" xmlns="" id="{5BCCF332-1E9A-49F3-9334-8D005377D909}"/>
+              </a:ext>
+            </a:extLst>
+          </p:cNvPr>
           <p:cNvSpPr>
             <a:spLocks noGrp="1"/>
           </p:cNvSpPr>
@@ -1139,7 +899,13 @@
       </p:sp>
       <p:sp>
         <p:nvSpPr>
-          <p:cNvPr id="6" name="Slide Number Placeholder 5"/>
+          <p:cNvPr id="6" name="Slide Number Placeholder 5">
+            <a:extLst>
+              <a:ext uri="{FF2B5EF4-FFF2-40B4-BE49-F238E27FC236}">
+                <a16:creationId xmlns:a16="http://schemas.microsoft.com/office/drawing/2014/main" xmlns="" id="{CC43042F-ABBF-41BC-8D93-3E9B1654ECD6}"/>
+              </a:ext>
+            </a:extLst>
+          </p:cNvPr>
           <p:cNvSpPr>
             <a:spLocks noGrp="1"/>
           </p:cNvSpPr>
@@ -1152,7 +918,7 @@
           <a:bodyPr/>
           <a:lstStyle/>
           <a:p>
-            <a:fld id="{FD040B35-C2C8-4B03-A2C0-F0A6EF7C8A1A}" type="slidenum">
+            <a:fld id="{8059F3A2-05ED-4BC7-846E-86953A6B9462}" type="slidenum">
               <a:rPr lang="en-US" smtClean="0"/>
               <a:t>‹#›</a:t>
             </a:fld>
@@ -1163,7 +929,7 @@
     </p:spTree>
     <p:extLst>
       <p:ext uri="{BB962C8B-B14F-4D97-AF65-F5344CB8AC3E}">
-        <p14:creationId xmlns:p14="http://schemas.microsoft.com/office/powerpoint/2010/main" val="430794640"/>
+        <p14:creationId xmlns:p14="http://schemas.microsoft.com/office/powerpoint/2010/main" val="604928807"/>
       </p:ext>
     </p:extLst>
   </p:cSld>
@@ -1192,7 +958,13 @@
       </p:grpSpPr>
       <p:sp>
         <p:nvSpPr>
-          <p:cNvPr id="2" name="Title 1"/>
+          <p:cNvPr id="2" name="Title 1">
+            <a:extLst>
+              <a:ext uri="{FF2B5EF4-FFF2-40B4-BE49-F238E27FC236}">
+                <a16:creationId xmlns:a16="http://schemas.microsoft.com/office/drawing/2014/main" xmlns="" id="{1BFBA20E-FD25-4C33-B4B2-236602739C59}"/>
+              </a:ext>
+            </a:extLst>
+          </p:cNvPr>
           <p:cNvSpPr>
             <a:spLocks noGrp="1"/>
           </p:cNvSpPr>
@@ -1223,7 +995,13 @@
       </p:sp>
       <p:sp>
         <p:nvSpPr>
-          <p:cNvPr id="3" name="Text Placeholder 2"/>
+          <p:cNvPr id="3" name="Text Placeholder 2">
+            <a:extLst>
+              <a:ext uri="{FF2B5EF4-FFF2-40B4-BE49-F238E27FC236}">
+                <a16:creationId xmlns:a16="http://schemas.microsoft.com/office/drawing/2014/main" xmlns="" id="{71A479EF-E0AC-4765-A43C-35B11A2D53B7}"/>
+              </a:ext>
+            </a:extLst>
+          </p:cNvPr>
           <p:cNvSpPr>
             <a:spLocks noGrp="1"/>
           </p:cNvSpPr>
@@ -1342,7 +1120,13 @@
       </p:sp>
       <p:sp>
         <p:nvSpPr>
-          <p:cNvPr id="4" name="Date Placeholder 3"/>
+          <p:cNvPr id="4" name="Date Placeholder 3">
+            <a:extLst>
+              <a:ext uri="{FF2B5EF4-FFF2-40B4-BE49-F238E27FC236}">
+                <a16:creationId xmlns:a16="http://schemas.microsoft.com/office/drawing/2014/main" xmlns="" id="{B0EC9609-3BA0-4FD0-BF55-14DC86D57FD7}"/>
+              </a:ext>
+            </a:extLst>
+          </p:cNvPr>
           <p:cNvSpPr>
             <a:spLocks noGrp="1"/>
           </p:cNvSpPr>
@@ -1355,9 +1139,9 @@
           <a:bodyPr/>
           <a:lstStyle/>
           <a:p>
-            <a:fld id="{535428D1-9A59-4290-BD36-5D96BA1289B0}" type="datetime1">
+            <a:fld id="{7CF88549-6791-4998-88F4-52B7B894EB4E}" type="datetimeFigureOut">
               <a:rPr lang="en-US" smtClean="0"/>
-              <a:t>8/21/2020</a:t>
+              <a:t>8/23/2020</a:t>
             </a:fld>
             <a:endParaRPr lang="en-US"/>
           </a:p>
@@ -1365,7 +1149,13 @@
       </p:sp>
       <p:sp>
         <p:nvSpPr>
-          <p:cNvPr id="5" name="Footer Placeholder 4"/>
+          <p:cNvPr id="5" name="Footer Placeholder 4">
+            <a:extLst>
+              <a:ext uri="{FF2B5EF4-FFF2-40B4-BE49-F238E27FC236}">
+                <a16:creationId xmlns:a16="http://schemas.microsoft.com/office/drawing/2014/main" xmlns="" id="{93470D29-446E-4CCC-94E2-ACDA4AE683AB}"/>
+              </a:ext>
+            </a:extLst>
+          </p:cNvPr>
           <p:cNvSpPr>
             <a:spLocks noGrp="1"/>
           </p:cNvSpPr>
@@ -1384,7 +1174,13 @@
       </p:sp>
       <p:sp>
         <p:nvSpPr>
-          <p:cNvPr id="6" name="Slide Number Placeholder 5"/>
+          <p:cNvPr id="6" name="Slide Number Placeholder 5">
+            <a:extLst>
+              <a:ext uri="{FF2B5EF4-FFF2-40B4-BE49-F238E27FC236}">
+                <a16:creationId xmlns:a16="http://schemas.microsoft.com/office/drawing/2014/main" xmlns="" id="{F4098CCD-2D96-4FFC-984C-F1FD5F7D3F1D}"/>
+              </a:ext>
+            </a:extLst>
+          </p:cNvPr>
           <p:cNvSpPr>
             <a:spLocks noGrp="1"/>
           </p:cNvSpPr>
@@ -1397,7 +1193,7 @@
           <a:bodyPr/>
           <a:lstStyle/>
           <a:p>
-            <a:fld id="{FD040B35-C2C8-4B03-A2C0-F0A6EF7C8A1A}" type="slidenum">
+            <a:fld id="{8059F3A2-05ED-4BC7-846E-86953A6B9462}" type="slidenum">
               <a:rPr lang="en-US" smtClean="0"/>
               <a:t>‹#›</a:t>
             </a:fld>
@@ -1408,7 +1204,7 @@
     </p:spTree>
     <p:extLst>
       <p:ext uri="{BB962C8B-B14F-4D97-AF65-F5344CB8AC3E}">
-        <p14:creationId xmlns:p14="http://schemas.microsoft.com/office/powerpoint/2010/main" val="303801852"/>
+        <p14:creationId xmlns:p14="http://schemas.microsoft.com/office/powerpoint/2010/main" val="370708567"/>
       </p:ext>
     </p:extLst>
   </p:cSld>
@@ -1437,7 +1233,13 @@
       </p:grpSpPr>
       <p:sp>
         <p:nvSpPr>
-          <p:cNvPr id="2" name="Title 1"/>
+          <p:cNvPr id="2" name="Title 1">
+            <a:extLst>
+              <a:ext uri="{FF2B5EF4-FFF2-40B4-BE49-F238E27FC236}">
+                <a16:creationId xmlns:a16="http://schemas.microsoft.com/office/drawing/2014/main" xmlns="" id="{217692B7-D32B-44AC-8868-A8FE908B3C08}"/>
+              </a:ext>
+            </a:extLst>
+          </p:cNvPr>
           <p:cNvSpPr>
             <a:spLocks noGrp="1"/>
           </p:cNvSpPr>
@@ -1459,7 +1261,13 @@
       </p:sp>
       <p:sp>
         <p:nvSpPr>
-          <p:cNvPr id="3" name="Content Placeholder 2"/>
+          <p:cNvPr id="3" name="Content Placeholder 2">
+            <a:extLst>
+              <a:ext uri="{FF2B5EF4-FFF2-40B4-BE49-F238E27FC236}">
+                <a16:creationId xmlns:a16="http://schemas.microsoft.com/office/drawing/2014/main" xmlns="" id="{91F388A4-6F7D-4949-B3A9-6AA660D328AD}"/>
+              </a:ext>
+            </a:extLst>
+          </p:cNvPr>
           <p:cNvSpPr>
             <a:spLocks noGrp="1"/>
           </p:cNvSpPr>
@@ -1515,7 +1323,13 @@
       </p:sp>
       <p:sp>
         <p:nvSpPr>
-          <p:cNvPr id="4" name="Content Placeholder 3"/>
+          <p:cNvPr id="4" name="Content Placeholder 3">
+            <a:extLst>
+              <a:ext uri="{FF2B5EF4-FFF2-40B4-BE49-F238E27FC236}">
+                <a16:creationId xmlns:a16="http://schemas.microsoft.com/office/drawing/2014/main" xmlns="" id="{19216C36-5C29-404A-9A26-02F3729C51E8}"/>
+              </a:ext>
+            </a:extLst>
+          </p:cNvPr>
           <p:cNvSpPr>
             <a:spLocks noGrp="1"/>
           </p:cNvSpPr>
@@ -1571,7 +1385,13 @@
       </p:sp>
       <p:sp>
         <p:nvSpPr>
-          <p:cNvPr id="5" name="Date Placeholder 4"/>
+          <p:cNvPr id="5" name="Date Placeholder 4">
+            <a:extLst>
+              <a:ext uri="{FF2B5EF4-FFF2-40B4-BE49-F238E27FC236}">
+                <a16:creationId xmlns:a16="http://schemas.microsoft.com/office/drawing/2014/main" xmlns="" id="{62B5ADFB-4574-4199-9D27-B4DB843C4970}"/>
+              </a:ext>
+            </a:extLst>
+          </p:cNvPr>
           <p:cNvSpPr>
             <a:spLocks noGrp="1"/>
           </p:cNvSpPr>
@@ -1584,9 +1404,9 @@
           <a:bodyPr/>
           <a:lstStyle/>
           <a:p>
-            <a:fld id="{5207212E-CEB3-43D2-A62A-3861E9395FD9}" type="datetime1">
+            <a:fld id="{7CF88549-6791-4998-88F4-52B7B894EB4E}" type="datetimeFigureOut">
               <a:rPr lang="en-US" smtClean="0"/>
-              <a:t>8/21/2020</a:t>
+              <a:t>8/23/2020</a:t>
             </a:fld>
             <a:endParaRPr lang="en-US"/>
           </a:p>
@@ -1594,7 +1414,13 @@
       </p:sp>
       <p:sp>
         <p:nvSpPr>
-          <p:cNvPr id="6" name="Footer Placeholder 5"/>
+          <p:cNvPr id="6" name="Footer Placeholder 5">
+            <a:extLst>
+              <a:ext uri="{FF2B5EF4-FFF2-40B4-BE49-F238E27FC236}">
+                <a16:creationId xmlns:a16="http://schemas.microsoft.com/office/drawing/2014/main" xmlns="" id="{0109B6B6-22B2-4532-BFC9-BF47219CED2E}"/>
+              </a:ext>
+            </a:extLst>
+          </p:cNvPr>
           <p:cNvSpPr>
             <a:spLocks noGrp="1"/>
           </p:cNvSpPr>
@@ -1613,7 +1439,13 @@
       </p:sp>
       <p:sp>
         <p:nvSpPr>
-          <p:cNvPr id="7" name="Slide Number Placeholder 6"/>
+          <p:cNvPr id="7" name="Slide Number Placeholder 6">
+            <a:extLst>
+              <a:ext uri="{FF2B5EF4-FFF2-40B4-BE49-F238E27FC236}">
+                <a16:creationId xmlns:a16="http://schemas.microsoft.com/office/drawing/2014/main" xmlns="" id="{E29ECD32-1C02-4E50-BF25-B848E196B391}"/>
+              </a:ext>
+            </a:extLst>
+          </p:cNvPr>
           <p:cNvSpPr>
             <a:spLocks noGrp="1"/>
           </p:cNvSpPr>
@@ -1626,7 +1458,7 @@
           <a:bodyPr/>
           <a:lstStyle/>
           <a:p>
-            <a:fld id="{FD040B35-C2C8-4B03-A2C0-F0A6EF7C8A1A}" type="slidenum">
+            <a:fld id="{8059F3A2-05ED-4BC7-846E-86953A6B9462}" type="slidenum">
               <a:rPr lang="en-US" smtClean="0"/>
               <a:t>‹#›</a:t>
             </a:fld>
@@ -1637,7 +1469,7 @@
     </p:spTree>
     <p:extLst>
       <p:ext uri="{BB962C8B-B14F-4D97-AF65-F5344CB8AC3E}">
-        <p14:creationId xmlns:p14="http://schemas.microsoft.com/office/powerpoint/2010/main" val="2772631777"/>
+        <p14:creationId xmlns:p14="http://schemas.microsoft.com/office/powerpoint/2010/main" val="833053180"/>
       </p:ext>
     </p:extLst>
   </p:cSld>
@@ -1666,7 +1498,13 @@
       </p:grpSpPr>
       <p:sp>
         <p:nvSpPr>
-          <p:cNvPr id="2" name="Title 1"/>
+          <p:cNvPr id="2" name="Title 1">
+            <a:extLst>
+              <a:ext uri="{FF2B5EF4-FFF2-40B4-BE49-F238E27FC236}">
+                <a16:creationId xmlns:a16="http://schemas.microsoft.com/office/drawing/2014/main" xmlns="" id="{020D5A17-5C9F-4012-8193-727C64077675}"/>
+              </a:ext>
+            </a:extLst>
+          </p:cNvPr>
           <p:cNvSpPr>
             <a:spLocks noGrp="1"/>
           </p:cNvSpPr>
@@ -1693,7 +1531,13 @@
       </p:sp>
       <p:sp>
         <p:nvSpPr>
-          <p:cNvPr id="3" name="Text Placeholder 2"/>
+          <p:cNvPr id="3" name="Text Placeholder 2">
+            <a:extLst>
+              <a:ext uri="{FF2B5EF4-FFF2-40B4-BE49-F238E27FC236}">
+                <a16:creationId xmlns:a16="http://schemas.microsoft.com/office/drawing/2014/main" xmlns="" id="{94430BDE-2353-4AB2-9F8E-2D2294E92B12}"/>
+              </a:ext>
+            </a:extLst>
+          </p:cNvPr>
           <p:cNvSpPr>
             <a:spLocks noGrp="1"/>
           </p:cNvSpPr>
@@ -1758,7 +1602,13 @@
       </p:sp>
       <p:sp>
         <p:nvSpPr>
-          <p:cNvPr id="4" name="Content Placeholder 3"/>
+          <p:cNvPr id="4" name="Content Placeholder 3">
+            <a:extLst>
+              <a:ext uri="{FF2B5EF4-FFF2-40B4-BE49-F238E27FC236}">
+                <a16:creationId xmlns:a16="http://schemas.microsoft.com/office/drawing/2014/main" xmlns="" id="{0D185C8A-3353-42C5-82CB-D274C11CE703}"/>
+              </a:ext>
+            </a:extLst>
+          </p:cNvPr>
           <p:cNvSpPr>
             <a:spLocks noGrp="1"/>
           </p:cNvSpPr>
@@ -1814,7 +1664,13 @@
       </p:sp>
       <p:sp>
         <p:nvSpPr>
-          <p:cNvPr id="5" name="Text Placeholder 4"/>
+          <p:cNvPr id="5" name="Text Placeholder 4">
+            <a:extLst>
+              <a:ext uri="{FF2B5EF4-FFF2-40B4-BE49-F238E27FC236}">
+                <a16:creationId xmlns:a16="http://schemas.microsoft.com/office/drawing/2014/main" xmlns="" id="{71DF05A5-7C68-4A96-B004-F26AD60C1EAB}"/>
+              </a:ext>
+            </a:extLst>
+          </p:cNvPr>
           <p:cNvSpPr>
             <a:spLocks noGrp="1"/>
           </p:cNvSpPr>
@@ -1879,7 +1735,13 @@
       </p:sp>
       <p:sp>
         <p:nvSpPr>
-          <p:cNvPr id="6" name="Content Placeholder 5"/>
+          <p:cNvPr id="6" name="Content Placeholder 5">
+            <a:extLst>
+              <a:ext uri="{FF2B5EF4-FFF2-40B4-BE49-F238E27FC236}">
+                <a16:creationId xmlns:a16="http://schemas.microsoft.com/office/drawing/2014/main" xmlns="" id="{26219510-EBB4-44C3-8588-20226A2B3137}"/>
+              </a:ext>
+            </a:extLst>
+          </p:cNvPr>
           <p:cNvSpPr>
             <a:spLocks noGrp="1"/>
           </p:cNvSpPr>
@@ -1935,7 +1797,13 @@
       </p:sp>
       <p:sp>
         <p:nvSpPr>
-          <p:cNvPr id="7" name="Date Placeholder 6"/>
+          <p:cNvPr id="7" name="Date Placeholder 6">
+            <a:extLst>
+              <a:ext uri="{FF2B5EF4-FFF2-40B4-BE49-F238E27FC236}">
+                <a16:creationId xmlns:a16="http://schemas.microsoft.com/office/drawing/2014/main" xmlns="" id="{450765A6-AD9C-484B-97ED-C68F79CD64CD}"/>
+              </a:ext>
+            </a:extLst>
+          </p:cNvPr>
           <p:cNvSpPr>
             <a:spLocks noGrp="1"/>
           </p:cNvSpPr>
@@ -1948,9 +1816,9 @@
           <a:bodyPr/>
           <a:lstStyle/>
           <a:p>
-            <a:fld id="{7BC2711A-2B61-40C4-B549-B42BCA66B1AB}" type="datetime1">
+            <a:fld id="{7CF88549-6791-4998-88F4-52B7B894EB4E}" type="datetimeFigureOut">
               <a:rPr lang="en-US" smtClean="0"/>
-              <a:t>8/21/2020</a:t>
+              <a:t>8/23/2020</a:t>
             </a:fld>
             <a:endParaRPr lang="en-US"/>
           </a:p>
@@ -1958,7 +1826,13 @@
       </p:sp>
       <p:sp>
         <p:nvSpPr>
-          <p:cNvPr id="8" name="Footer Placeholder 7"/>
+          <p:cNvPr id="8" name="Footer Placeholder 7">
+            <a:extLst>
+              <a:ext uri="{FF2B5EF4-FFF2-40B4-BE49-F238E27FC236}">
+                <a16:creationId xmlns:a16="http://schemas.microsoft.com/office/drawing/2014/main" xmlns="" id="{AAFDAC4A-0D7B-49D1-A6C5-12127D91CA57}"/>
+              </a:ext>
+            </a:extLst>
+          </p:cNvPr>
           <p:cNvSpPr>
             <a:spLocks noGrp="1"/>
           </p:cNvSpPr>
@@ -1977,7 +1851,13 @@
       </p:sp>
       <p:sp>
         <p:nvSpPr>
-          <p:cNvPr id="9" name="Slide Number Placeholder 8"/>
+          <p:cNvPr id="9" name="Slide Number Placeholder 8">
+            <a:extLst>
+              <a:ext uri="{FF2B5EF4-FFF2-40B4-BE49-F238E27FC236}">
+                <a16:creationId xmlns:a16="http://schemas.microsoft.com/office/drawing/2014/main" xmlns="" id="{BFC2A667-6640-4869-A2D5-427B6DEAF393}"/>
+              </a:ext>
+            </a:extLst>
+          </p:cNvPr>
           <p:cNvSpPr>
             <a:spLocks noGrp="1"/>
           </p:cNvSpPr>
@@ -1990,7 +1870,7 @@
           <a:bodyPr/>
           <a:lstStyle/>
           <a:p>
-            <a:fld id="{FD040B35-C2C8-4B03-A2C0-F0A6EF7C8A1A}" type="slidenum">
+            <a:fld id="{8059F3A2-05ED-4BC7-846E-86953A6B9462}" type="slidenum">
               <a:rPr lang="en-US" smtClean="0"/>
               <a:t>‹#›</a:t>
             </a:fld>
@@ -2001,7 +1881,7 @@
     </p:spTree>
     <p:extLst>
       <p:ext uri="{BB962C8B-B14F-4D97-AF65-F5344CB8AC3E}">
-        <p14:creationId xmlns:p14="http://schemas.microsoft.com/office/powerpoint/2010/main" val="2915570821"/>
+        <p14:creationId xmlns:p14="http://schemas.microsoft.com/office/powerpoint/2010/main" val="1658596776"/>
       </p:ext>
     </p:extLst>
   </p:cSld>
@@ -2030,7 +1910,13 @@
       </p:grpSpPr>
       <p:sp>
         <p:nvSpPr>
-          <p:cNvPr id="2" name="Title 1"/>
+          <p:cNvPr id="2" name="Title 1">
+            <a:extLst>
+              <a:ext uri="{FF2B5EF4-FFF2-40B4-BE49-F238E27FC236}">
+                <a16:creationId xmlns:a16="http://schemas.microsoft.com/office/drawing/2014/main" xmlns="" id="{FF7F7D81-4CA5-49C6-BBA8-14FEE77C69AE}"/>
+              </a:ext>
+            </a:extLst>
+          </p:cNvPr>
           <p:cNvSpPr>
             <a:spLocks noGrp="1"/>
           </p:cNvSpPr>
@@ -2052,7 +1938,13 @@
       </p:sp>
       <p:sp>
         <p:nvSpPr>
-          <p:cNvPr id="3" name="Date Placeholder 2"/>
+          <p:cNvPr id="3" name="Date Placeholder 2">
+            <a:extLst>
+              <a:ext uri="{FF2B5EF4-FFF2-40B4-BE49-F238E27FC236}">
+                <a16:creationId xmlns:a16="http://schemas.microsoft.com/office/drawing/2014/main" xmlns="" id="{F0C7A95B-93BE-470A-8A8C-528D34EC8029}"/>
+              </a:ext>
+            </a:extLst>
+          </p:cNvPr>
           <p:cNvSpPr>
             <a:spLocks noGrp="1"/>
           </p:cNvSpPr>
@@ -2065,9 +1957,9 @@
           <a:bodyPr/>
           <a:lstStyle/>
           <a:p>
-            <a:fld id="{BF37A5FC-EB9B-47ED-A3C9-779BB566366E}" type="datetime1">
+            <a:fld id="{7CF88549-6791-4998-88F4-52B7B894EB4E}" type="datetimeFigureOut">
               <a:rPr lang="en-US" smtClean="0"/>
-              <a:t>8/21/2020</a:t>
+              <a:t>8/23/2020</a:t>
             </a:fld>
             <a:endParaRPr lang="en-US"/>
           </a:p>
@@ -2075,7 +1967,13 @@
       </p:sp>
       <p:sp>
         <p:nvSpPr>
-          <p:cNvPr id="4" name="Footer Placeholder 3"/>
+          <p:cNvPr id="4" name="Footer Placeholder 3">
+            <a:extLst>
+              <a:ext uri="{FF2B5EF4-FFF2-40B4-BE49-F238E27FC236}">
+                <a16:creationId xmlns:a16="http://schemas.microsoft.com/office/drawing/2014/main" xmlns="" id="{B81C91B7-BA5F-4485-9FE4-A37CBAC990F9}"/>
+              </a:ext>
+            </a:extLst>
+          </p:cNvPr>
           <p:cNvSpPr>
             <a:spLocks noGrp="1"/>
           </p:cNvSpPr>
@@ -2094,7 +1992,13 @@
       </p:sp>
       <p:sp>
         <p:nvSpPr>
-          <p:cNvPr id="5" name="Slide Number Placeholder 4"/>
+          <p:cNvPr id="5" name="Slide Number Placeholder 4">
+            <a:extLst>
+              <a:ext uri="{FF2B5EF4-FFF2-40B4-BE49-F238E27FC236}">
+                <a16:creationId xmlns:a16="http://schemas.microsoft.com/office/drawing/2014/main" xmlns="" id="{22C09968-0090-4875-9AF2-77723BD22C94}"/>
+              </a:ext>
+            </a:extLst>
+          </p:cNvPr>
           <p:cNvSpPr>
             <a:spLocks noGrp="1"/>
           </p:cNvSpPr>
@@ -2107,7 +2011,7 @@
           <a:bodyPr/>
           <a:lstStyle/>
           <a:p>
-            <a:fld id="{FD040B35-C2C8-4B03-A2C0-F0A6EF7C8A1A}" type="slidenum">
+            <a:fld id="{8059F3A2-05ED-4BC7-846E-86953A6B9462}" type="slidenum">
               <a:rPr lang="en-US" smtClean="0"/>
               <a:t>‹#›</a:t>
             </a:fld>
@@ -2118,7 +2022,7 @@
     </p:spTree>
     <p:extLst>
       <p:ext uri="{BB962C8B-B14F-4D97-AF65-F5344CB8AC3E}">
-        <p14:creationId xmlns:p14="http://schemas.microsoft.com/office/powerpoint/2010/main" val="859689377"/>
+        <p14:creationId xmlns:p14="http://schemas.microsoft.com/office/powerpoint/2010/main" val="1582952938"/>
       </p:ext>
     </p:extLst>
   </p:cSld>
@@ -2147,7 +2051,13 @@
       </p:grpSpPr>
       <p:sp>
         <p:nvSpPr>
-          <p:cNvPr id="2" name="Date Placeholder 1"/>
+          <p:cNvPr id="2" name="Date Placeholder 1">
+            <a:extLst>
+              <a:ext uri="{FF2B5EF4-FFF2-40B4-BE49-F238E27FC236}">
+                <a16:creationId xmlns:a16="http://schemas.microsoft.com/office/drawing/2014/main" xmlns="" id="{75C88817-87F4-4B30-A364-9FB0C3F96924}"/>
+              </a:ext>
+            </a:extLst>
+          </p:cNvPr>
           <p:cNvSpPr>
             <a:spLocks noGrp="1"/>
           </p:cNvSpPr>
@@ -2160,9 +2070,9 @@
           <a:bodyPr/>
           <a:lstStyle/>
           <a:p>
-            <a:fld id="{8C2FBAD0-6CE6-4F85-B67B-FB1B81FBD1AC}" type="datetime1">
+            <a:fld id="{7CF88549-6791-4998-88F4-52B7B894EB4E}" type="datetimeFigureOut">
               <a:rPr lang="en-US" smtClean="0"/>
-              <a:t>8/21/2020</a:t>
+              <a:t>8/23/2020</a:t>
             </a:fld>
             <a:endParaRPr lang="en-US"/>
           </a:p>
@@ -2170,7 +2080,13 @@
       </p:sp>
       <p:sp>
         <p:nvSpPr>
-          <p:cNvPr id="3" name="Footer Placeholder 2"/>
+          <p:cNvPr id="3" name="Footer Placeholder 2">
+            <a:extLst>
+              <a:ext uri="{FF2B5EF4-FFF2-40B4-BE49-F238E27FC236}">
+                <a16:creationId xmlns:a16="http://schemas.microsoft.com/office/drawing/2014/main" xmlns="" id="{4EAE7A97-CB24-44DB-B978-3F3B74ED72AB}"/>
+              </a:ext>
+            </a:extLst>
+          </p:cNvPr>
           <p:cNvSpPr>
             <a:spLocks noGrp="1"/>
           </p:cNvSpPr>
@@ -2189,7 +2105,13 @@
       </p:sp>
       <p:sp>
         <p:nvSpPr>
-          <p:cNvPr id="4" name="Slide Number Placeholder 3"/>
+          <p:cNvPr id="4" name="Slide Number Placeholder 3">
+            <a:extLst>
+              <a:ext uri="{FF2B5EF4-FFF2-40B4-BE49-F238E27FC236}">
+                <a16:creationId xmlns:a16="http://schemas.microsoft.com/office/drawing/2014/main" xmlns="" id="{1B9B82C2-0C94-48FD-A371-2629241F5AA5}"/>
+              </a:ext>
+            </a:extLst>
+          </p:cNvPr>
           <p:cNvSpPr>
             <a:spLocks noGrp="1"/>
           </p:cNvSpPr>
@@ -2202,7 +2124,7 @@
           <a:bodyPr/>
           <a:lstStyle/>
           <a:p>
-            <a:fld id="{FD040B35-C2C8-4B03-A2C0-F0A6EF7C8A1A}" type="slidenum">
+            <a:fld id="{8059F3A2-05ED-4BC7-846E-86953A6B9462}" type="slidenum">
               <a:rPr lang="en-US" smtClean="0"/>
               <a:t>‹#›</a:t>
             </a:fld>
@@ -2213,7 +2135,7 @@
     </p:spTree>
     <p:extLst>
       <p:ext uri="{BB962C8B-B14F-4D97-AF65-F5344CB8AC3E}">
-        <p14:creationId xmlns:p14="http://schemas.microsoft.com/office/powerpoint/2010/main" val="4020653363"/>
+        <p14:creationId xmlns:p14="http://schemas.microsoft.com/office/powerpoint/2010/main" val="3871423617"/>
       </p:ext>
     </p:extLst>
   </p:cSld>
@@ -2242,7 +2164,13 @@
       </p:grpSpPr>
       <p:sp>
         <p:nvSpPr>
-          <p:cNvPr id="2" name="Title 1"/>
+          <p:cNvPr id="2" name="Title 1">
+            <a:extLst>
+              <a:ext uri="{FF2B5EF4-FFF2-40B4-BE49-F238E27FC236}">
+                <a16:creationId xmlns:a16="http://schemas.microsoft.com/office/drawing/2014/main" xmlns="" id="{4335114F-499C-45D0-BBDF-A5912F5E3106}"/>
+              </a:ext>
+            </a:extLst>
+          </p:cNvPr>
           <p:cNvSpPr>
             <a:spLocks noGrp="1"/>
           </p:cNvSpPr>
@@ -2273,7 +2201,13 @@
       </p:sp>
       <p:sp>
         <p:nvSpPr>
-          <p:cNvPr id="3" name="Content Placeholder 2"/>
+          <p:cNvPr id="3" name="Content Placeholder 2">
+            <a:extLst>
+              <a:ext uri="{FF2B5EF4-FFF2-40B4-BE49-F238E27FC236}">
+                <a16:creationId xmlns:a16="http://schemas.microsoft.com/office/drawing/2014/main" xmlns="" id="{71F6CAA0-0758-437B-A122-722E93C6D2ED}"/>
+              </a:ext>
+            </a:extLst>
+          </p:cNvPr>
           <p:cNvSpPr>
             <a:spLocks noGrp="1"/>
           </p:cNvSpPr>
@@ -2357,7 +2291,13 @@
       </p:sp>
       <p:sp>
         <p:nvSpPr>
-          <p:cNvPr id="4" name="Text Placeholder 3"/>
+          <p:cNvPr id="4" name="Text Placeholder 3">
+            <a:extLst>
+              <a:ext uri="{FF2B5EF4-FFF2-40B4-BE49-F238E27FC236}">
+                <a16:creationId xmlns:a16="http://schemas.microsoft.com/office/drawing/2014/main" xmlns="" id="{F97B9788-3340-493F-9636-8A6929D9E0B4}"/>
+              </a:ext>
+            </a:extLst>
+          </p:cNvPr>
           <p:cNvSpPr>
             <a:spLocks noGrp="1"/>
           </p:cNvSpPr>
@@ -2422,7 +2362,13 @@
       </p:sp>
       <p:sp>
         <p:nvSpPr>
-          <p:cNvPr id="5" name="Date Placeholder 4"/>
+          <p:cNvPr id="5" name="Date Placeholder 4">
+            <a:extLst>
+              <a:ext uri="{FF2B5EF4-FFF2-40B4-BE49-F238E27FC236}">
+                <a16:creationId xmlns:a16="http://schemas.microsoft.com/office/drawing/2014/main" xmlns="" id="{1F8F0F4E-9AA4-42BC-AD71-32BECBD55A25}"/>
+              </a:ext>
+            </a:extLst>
+          </p:cNvPr>
           <p:cNvSpPr>
             <a:spLocks noGrp="1"/>
           </p:cNvSpPr>
@@ -2435,9 +2381,9 @@
           <a:bodyPr/>
           <a:lstStyle/>
           <a:p>
-            <a:fld id="{0D054454-8B80-4145-A0FB-7344760972B0}" type="datetime1">
+            <a:fld id="{7CF88549-6791-4998-88F4-52B7B894EB4E}" type="datetimeFigureOut">
               <a:rPr lang="en-US" smtClean="0"/>
-              <a:t>8/21/2020</a:t>
+              <a:t>8/23/2020</a:t>
             </a:fld>
             <a:endParaRPr lang="en-US"/>
           </a:p>
@@ -2445,7 +2391,13 @@
       </p:sp>
       <p:sp>
         <p:nvSpPr>
-          <p:cNvPr id="6" name="Footer Placeholder 5"/>
+          <p:cNvPr id="6" name="Footer Placeholder 5">
+            <a:extLst>
+              <a:ext uri="{FF2B5EF4-FFF2-40B4-BE49-F238E27FC236}">
+                <a16:creationId xmlns:a16="http://schemas.microsoft.com/office/drawing/2014/main" xmlns="" id="{30C22F7E-CC16-4FB6-950E-4BAB7CEECBDC}"/>
+              </a:ext>
+            </a:extLst>
+          </p:cNvPr>
           <p:cNvSpPr>
             <a:spLocks noGrp="1"/>
           </p:cNvSpPr>
@@ -2464,7 +2416,13 @@
       </p:sp>
       <p:sp>
         <p:nvSpPr>
-          <p:cNvPr id="7" name="Slide Number Placeholder 6"/>
+          <p:cNvPr id="7" name="Slide Number Placeholder 6">
+            <a:extLst>
+              <a:ext uri="{FF2B5EF4-FFF2-40B4-BE49-F238E27FC236}">
+                <a16:creationId xmlns:a16="http://schemas.microsoft.com/office/drawing/2014/main" xmlns="" id="{A8D381F3-40AC-4236-BD24-164CA3F3394D}"/>
+              </a:ext>
+            </a:extLst>
+          </p:cNvPr>
           <p:cNvSpPr>
             <a:spLocks noGrp="1"/>
           </p:cNvSpPr>
@@ -2477,7 +2435,7 @@
           <a:bodyPr/>
           <a:lstStyle/>
           <a:p>
-            <a:fld id="{FD040B35-C2C8-4B03-A2C0-F0A6EF7C8A1A}" type="slidenum">
+            <a:fld id="{8059F3A2-05ED-4BC7-846E-86953A6B9462}" type="slidenum">
               <a:rPr lang="en-US" smtClean="0"/>
               <a:t>‹#›</a:t>
             </a:fld>
@@ -2488,7 +2446,7 @@
     </p:spTree>
     <p:extLst>
       <p:ext uri="{BB962C8B-B14F-4D97-AF65-F5344CB8AC3E}">
-        <p14:creationId xmlns:p14="http://schemas.microsoft.com/office/powerpoint/2010/main" val="1206701393"/>
+        <p14:creationId xmlns:p14="http://schemas.microsoft.com/office/powerpoint/2010/main" val="1261363796"/>
       </p:ext>
     </p:extLst>
   </p:cSld>
@@ -2517,7 +2475,13 @@
       </p:grpSpPr>
       <p:sp>
         <p:nvSpPr>
-          <p:cNvPr id="2" name="Title 1"/>
+          <p:cNvPr id="2" name="Title 1">
+            <a:extLst>
+              <a:ext uri="{FF2B5EF4-FFF2-40B4-BE49-F238E27FC236}">
+                <a16:creationId xmlns:a16="http://schemas.microsoft.com/office/drawing/2014/main" xmlns="" id="{B3B5E9CA-0713-4972-8F7C-E18F9B92D431}"/>
+              </a:ext>
+            </a:extLst>
+          </p:cNvPr>
           <p:cNvSpPr>
             <a:spLocks noGrp="1"/>
           </p:cNvSpPr>
@@ -2548,7 +2512,13 @@
       </p:sp>
       <p:sp>
         <p:nvSpPr>
-          <p:cNvPr id="3" name="Picture Placeholder 2"/>
+          <p:cNvPr id="3" name="Picture Placeholder 2">
+            <a:extLst>
+              <a:ext uri="{FF2B5EF4-FFF2-40B4-BE49-F238E27FC236}">
+                <a16:creationId xmlns:a16="http://schemas.microsoft.com/office/drawing/2014/main" xmlns="" id="{56D33F0B-BC4C-472F-AA18-3EC1B787B0B7}"/>
+              </a:ext>
+            </a:extLst>
+          </p:cNvPr>
           <p:cNvSpPr>
             <a:spLocks noGrp="1"/>
           </p:cNvSpPr>
@@ -2609,7 +2579,13 @@
       </p:sp>
       <p:sp>
         <p:nvSpPr>
-          <p:cNvPr id="4" name="Text Placeholder 3"/>
+          <p:cNvPr id="4" name="Text Placeholder 3">
+            <a:extLst>
+              <a:ext uri="{FF2B5EF4-FFF2-40B4-BE49-F238E27FC236}">
+                <a16:creationId xmlns:a16="http://schemas.microsoft.com/office/drawing/2014/main" xmlns="" id="{953525F8-4DA0-4022-A8B8-33E8BA932BBF}"/>
+              </a:ext>
+            </a:extLst>
+          </p:cNvPr>
           <p:cNvSpPr>
             <a:spLocks noGrp="1"/>
           </p:cNvSpPr>
@@ -2674,7 +2650,13 @@
       </p:sp>
       <p:sp>
         <p:nvSpPr>
-          <p:cNvPr id="5" name="Date Placeholder 4"/>
+          <p:cNvPr id="5" name="Date Placeholder 4">
+            <a:extLst>
+              <a:ext uri="{FF2B5EF4-FFF2-40B4-BE49-F238E27FC236}">
+                <a16:creationId xmlns:a16="http://schemas.microsoft.com/office/drawing/2014/main" xmlns="" id="{680A05AD-1625-41EE-8694-AA7E1CCA5064}"/>
+              </a:ext>
+            </a:extLst>
+          </p:cNvPr>
           <p:cNvSpPr>
             <a:spLocks noGrp="1"/>
           </p:cNvSpPr>
@@ -2687,9 +2669,9 @@
           <a:bodyPr/>
           <a:lstStyle/>
           <a:p>
-            <a:fld id="{D1C32E75-9D2E-4C2C-A348-06104022F6CD}" type="datetime1">
+            <a:fld id="{7CF88549-6791-4998-88F4-52B7B894EB4E}" type="datetimeFigureOut">
               <a:rPr lang="en-US" smtClean="0"/>
-              <a:t>8/21/2020</a:t>
+              <a:t>8/23/2020</a:t>
             </a:fld>
             <a:endParaRPr lang="en-US"/>
           </a:p>
@@ -2697,7 +2679,13 @@
       </p:sp>
       <p:sp>
         <p:nvSpPr>
-          <p:cNvPr id="6" name="Footer Placeholder 5"/>
+          <p:cNvPr id="6" name="Footer Placeholder 5">
+            <a:extLst>
+              <a:ext uri="{FF2B5EF4-FFF2-40B4-BE49-F238E27FC236}">
+                <a16:creationId xmlns:a16="http://schemas.microsoft.com/office/drawing/2014/main" xmlns="" id="{5D7F428F-409E-42B6-9DCD-41ECDE9BA563}"/>
+              </a:ext>
+            </a:extLst>
+          </p:cNvPr>
           <p:cNvSpPr>
             <a:spLocks noGrp="1"/>
           </p:cNvSpPr>
@@ -2716,7 +2704,13 @@
       </p:sp>
       <p:sp>
         <p:nvSpPr>
-          <p:cNvPr id="7" name="Slide Number Placeholder 6"/>
+          <p:cNvPr id="7" name="Slide Number Placeholder 6">
+            <a:extLst>
+              <a:ext uri="{FF2B5EF4-FFF2-40B4-BE49-F238E27FC236}">
+                <a16:creationId xmlns:a16="http://schemas.microsoft.com/office/drawing/2014/main" xmlns="" id="{5B5CD492-8F6E-493B-9D2C-4C0B01E40CCE}"/>
+              </a:ext>
+            </a:extLst>
+          </p:cNvPr>
           <p:cNvSpPr>
             <a:spLocks noGrp="1"/>
           </p:cNvSpPr>
@@ -2729,7 +2723,7 @@
           <a:bodyPr/>
           <a:lstStyle/>
           <a:p>
-            <a:fld id="{FD040B35-C2C8-4B03-A2C0-F0A6EF7C8A1A}" type="slidenum">
+            <a:fld id="{8059F3A2-05ED-4BC7-846E-86953A6B9462}" type="slidenum">
               <a:rPr lang="en-US" smtClean="0"/>
               <a:t>‹#›</a:t>
             </a:fld>
@@ -2740,7 +2734,7 @@
     </p:spTree>
     <p:extLst>
       <p:ext uri="{BB962C8B-B14F-4D97-AF65-F5344CB8AC3E}">
-        <p14:creationId xmlns:p14="http://schemas.microsoft.com/office/powerpoint/2010/main" val="845453843"/>
+        <p14:creationId xmlns:p14="http://schemas.microsoft.com/office/powerpoint/2010/main" val="2292404976"/>
       </p:ext>
     </p:extLst>
   </p:cSld>
@@ -2774,7 +2768,13 @@
       </p:grpSpPr>
       <p:sp>
         <p:nvSpPr>
-          <p:cNvPr id="2" name="Title Placeholder 1"/>
+          <p:cNvPr id="2" name="Title Placeholder 1">
+            <a:extLst>
+              <a:ext uri="{FF2B5EF4-FFF2-40B4-BE49-F238E27FC236}">
+                <a16:creationId xmlns:a16="http://schemas.microsoft.com/office/drawing/2014/main" xmlns="" id="{5089D76D-C94F-4E55-A2F0-86D64FB32BEB}"/>
+              </a:ext>
+            </a:extLst>
+          </p:cNvPr>
           <p:cNvSpPr>
             <a:spLocks noGrp="1"/>
           </p:cNvSpPr>
@@ -2806,7 +2806,13 @@
       </p:sp>
       <p:sp>
         <p:nvSpPr>
-          <p:cNvPr id="3" name="Text Placeholder 2"/>
+          <p:cNvPr id="3" name="Text Placeholder 2">
+            <a:extLst>
+              <a:ext uri="{FF2B5EF4-FFF2-40B4-BE49-F238E27FC236}">
+                <a16:creationId xmlns:a16="http://schemas.microsoft.com/office/drawing/2014/main" xmlns="" id="{F31393B4-A664-433E-9F06-2A27064F2F2C}"/>
+              </a:ext>
+            </a:extLst>
+          </p:cNvPr>
           <p:cNvSpPr>
             <a:spLocks noGrp="1"/>
           </p:cNvSpPr>
@@ -2867,7 +2873,13 @@
       </p:sp>
       <p:sp>
         <p:nvSpPr>
-          <p:cNvPr id="4" name="Date Placeholder 3"/>
+          <p:cNvPr id="4" name="Date Placeholder 3">
+            <a:extLst>
+              <a:ext uri="{FF2B5EF4-FFF2-40B4-BE49-F238E27FC236}">
+                <a16:creationId xmlns:a16="http://schemas.microsoft.com/office/drawing/2014/main" xmlns="" id="{B0B8E49D-C489-4402-A705-6BAE384F9FF8}"/>
+              </a:ext>
+            </a:extLst>
+          </p:cNvPr>
           <p:cNvSpPr>
             <a:spLocks noGrp="1"/>
           </p:cNvSpPr>
@@ -2898,9 +2910,9 @@
             </a:lvl1pPr>
           </a:lstStyle>
           <a:p>
-            <a:fld id="{78EB6DD5-5CBA-4808-805B-C33400A06F8C}" type="datetime1">
+            <a:fld id="{7CF88549-6791-4998-88F4-52B7B894EB4E}" type="datetimeFigureOut">
               <a:rPr lang="en-US" smtClean="0"/>
-              <a:t>8/21/2020</a:t>
+              <a:t>8/23/2020</a:t>
             </a:fld>
             <a:endParaRPr lang="en-US"/>
           </a:p>
@@ -2908,7 +2920,13 @@
       </p:sp>
       <p:sp>
         <p:nvSpPr>
-          <p:cNvPr id="5" name="Footer Placeholder 4"/>
+          <p:cNvPr id="5" name="Footer Placeholder 4">
+            <a:extLst>
+              <a:ext uri="{FF2B5EF4-FFF2-40B4-BE49-F238E27FC236}">
+                <a16:creationId xmlns:a16="http://schemas.microsoft.com/office/drawing/2014/main" xmlns="" id="{FC4CDF9A-A923-4A5D-A877-CA1C4CB7A9FD}"/>
+              </a:ext>
+            </a:extLst>
+          </p:cNvPr>
           <p:cNvSpPr>
             <a:spLocks noGrp="1"/>
           </p:cNvSpPr>
@@ -2945,7 +2963,13 @@
       </p:sp>
       <p:sp>
         <p:nvSpPr>
-          <p:cNvPr id="6" name="Slide Number Placeholder 5"/>
+          <p:cNvPr id="6" name="Slide Number Placeholder 5">
+            <a:extLst>
+              <a:ext uri="{FF2B5EF4-FFF2-40B4-BE49-F238E27FC236}">
+                <a16:creationId xmlns:a16="http://schemas.microsoft.com/office/drawing/2014/main" xmlns="" id="{17B75C51-DDA4-4559-8E44-A85D563C3EF6}"/>
+              </a:ext>
+            </a:extLst>
+          </p:cNvPr>
           <p:cNvSpPr>
             <a:spLocks noGrp="1"/>
           </p:cNvSpPr>
@@ -2976,7 +3000,7 @@
             </a:lvl1pPr>
           </a:lstStyle>
           <a:p>
-            <a:fld id="{FD040B35-C2C8-4B03-A2C0-F0A6EF7C8A1A}" type="slidenum">
+            <a:fld id="{8059F3A2-05ED-4BC7-846E-86953A6B9462}" type="slidenum">
               <a:rPr lang="en-US" smtClean="0"/>
               <a:t>‹#›</a:t>
             </a:fld>
@@ -2987,7 +3011,7 @@
     </p:spTree>
     <p:extLst>
       <p:ext uri="{BB962C8B-B14F-4D97-AF65-F5344CB8AC3E}">
-        <p14:creationId xmlns:p14="http://schemas.microsoft.com/office/powerpoint/2010/main" val="142163759"/>
+        <p14:creationId xmlns:p14="http://schemas.microsoft.com/office/powerpoint/2010/main" val="2863762422"/>
       </p:ext>
     </p:extLst>
   </p:cSld>
@@ -3005,7 +3029,6 @@
     <p:sldLayoutId id="2147483658" r:id="rId10"/>
     <p:sldLayoutId id="2147483659" r:id="rId11"/>
   </p:sldLayoutIdLst>
-  <p:hf sldNum="0" hdr="0" ftr="0"/>
   <p:txStyles>
     <p:titleStyle>
       <a:lvl1pPr algn="l" defTabSz="914400" rtl="0" eaLnBrk="1" latinLnBrk="0" hangingPunct="1">
@@ -3308,110 +3331,427 @@
       </p:grpSpPr>
       <p:sp>
         <p:nvSpPr>
-          <p:cNvPr id="2" name="Title 1"/>
-          <p:cNvSpPr>
-            <a:spLocks noGrp="1"/>
-          </p:cNvSpPr>
-          <p:nvPr>
-            <p:ph type="ctrTitle"/>
-          </p:nvPr>
-        </p:nvSpPr>
-        <p:spPr/>
-        <p:txBody>
-          <a:bodyPr>
-            <a:normAutofit fontScale="90000"/>
-          </a:bodyPr>
-          <a:lstStyle/>
-          <a:p>
-            <a:r>
-              <a:rPr lang="en-US" dirty="0"/>
-              <a:t>ASPE Student challenge mounting provisions for the Z axis scribing head</a:t>
-            </a:r>
-          </a:p>
-        </p:txBody>
-      </p:sp>
-      <p:sp>
-        <p:nvSpPr>
-          <p:cNvPr id="3" name="Subtitle 2"/>
-          <p:cNvSpPr>
-            <a:spLocks noGrp="1"/>
-          </p:cNvSpPr>
-          <p:nvPr>
-            <p:ph type="subTitle" idx="1"/>
-          </p:nvPr>
-        </p:nvSpPr>
-        <p:spPr/>
-        <p:txBody>
-          <a:bodyPr/>
-          <a:lstStyle/>
-          <a:p>
-            <a:r>
-              <a:rPr lang="en-US" dirty="0"/>
-              <a:t>Mark Kosmowski</a:t>
-            </a:r>
-          </a:p>
-          <a:p>
-            <a:endParaRPr lang="en-US" dirty="0"/>
-          </a:p>
-        </p:txBody>
-      </p:sp>
-      <p:sp>
-        <p:nvSpPr>
-          <p:cNvPr id="4" name="Date Placeholder 3">
-            <a:extLst>
-              <a:ext uri="{FF2B5EF4-FFF2-40B4-BE49-F238E27FC236}">
-                <a16:creationId xmlns:a16="http://schemas.microsoft.com/office/drawing/2014/main" id="{E9AFBC31-F4FD-49B4-8917-C6C46D8B82C7}"/>
-              </a:ext>
-            </a:extLst>
-          </p:cNvPr>
-          <p:cNvSpPr>
-            <a:spLocks noGrp="1"/>
-          </p:cNvSpPr>
-          <p:nvPr>
-            <p:ph type="dt" sz="half" idx="10"/>
+          <p:cNvPr id="4" name="Title 3">
+            <a:extLst>
+              <a:ext uri="{FF2B5EF4-FFF2-40B4-BE49-F238E27FC236}">
+                <a16:creationId xmlns:a16="http://schemas.microsoft.com/office/drawing/2014/main" xmlns="" id="{AFE2E0CC-5F97-4743-95D1-D582D131633C}"/>
+              </a:ext>
+            </a:extLst>
+          </p:cNvPr>
+          <p:cNvSpPr>
+            <a:spLocks noGrp="1"/>
+          </p:cNvSpPr>
+          <p:nvPr>
+            <p:ph type="title"/>
           </p:nvPr>
         </p:nvSpPr>
         <p:spPr>
           <a:xfrm>
-            <a:off x="951410" y="6356350"/>
-            <a:ext cx="6729549" cy="365125"/>
+            <a:off x="157065" y="229959"/>
+            <a:ext cx="10515600" cy="1325563"/>
           </a:xfrm>
         </p:spPr>
         <p:txBody>
-          <a:bodyPr/>
-          <a:lstStyle/>
-          <a:p>
-            <a:fld id="{42586553-001E-4F02-A830-AC12E570DB99}" type="datetime1">
-              <a:rPr lang="en-US" sz="1800" b="1" smtClean="0">
-                <a:solidFill>
-                  <a:srgbClr val="FF0000"/>
-                </a:solidFill>
+          <a:bodyPr>
+            <a:noAutofit/>
+          </a:bodyPr>
+          <a:lstStyle/>
+          <a:p>
+            <a:r>
+              <a:rPr lang="en-US" sz="3200" dirty="0"/>
+              <a:t>Overview of the two-axis air bearing stage that will be used in the second phase of the student challenge in 2021</a:t>
+            </a:r>
+          </a:p>
+        </p:txBody>
+      </p:sp>
+      <p:pic>
+        <p:nvPicPr>
+          <p:cNvPr id="5" name="Picture 4">
+            <a:extLst>
+              <a:ext uri="{FF2B5EF4-FFF2-40B4-BE49-F238E27FC236}">
+                <a16:creationId xmlns:a16="http://schemas.microsoft.com/office/drawing/2014/main" xmlns="" id="{03438FA5-C6CB-4960-9B21-0220A2D89905}"/>
+              </a:ext>
+            </a:extLst>
+          </p:cNvPr>
+          <p:cNvPicPr>
+            <a:picLocks noChangeAspect="1"/>
+          </p:cNvPicPr>
+          <p:nvPr/>
+        </p:nvPicPr>
+        <p:blipFill>
+          <a:blip r:embed="rId2"/>
+          <a:stretch>
+            <a:fillRect/>
+          </a:stretch>
+        </p:blipFill>
+        <p:spPr>
+          <a:xfrm>
+            <a:off x="2033949" y="2470754"/>
+            <a:ext cx="7784592" cy="4007714"/>
+          </a:xfrm>
+          <a:prstGeom prst="rect">
+            <a:avLst/>
+          </a:prstGeom>
+        </p:spPr>
+      </p:pic>
+      <p:sp>
+        <p:nvSpPr>
+          <p:cNvPr id="6" name="TextBox 5">
+            <a:extLst>
+              <a:ext uri="{FF2B5EF4-FFF2-40B4-BE49-F238E27FC236}">
+                <a16:creationId xmlns:a16="http://schemas.microsoft.com/office/drawing/2014/main" xmlns="" id="{02EF2704-01FD-4178-8950-C8D9AF2019E4}"/>
+              </a:ext>
+            </a:extLst>
+          </p:cNvPr>
+          <p:cNvSpPr txBox="1"/>
+          <p:nvPr/>
+        </p:nvSpPr>
+        <p:spPr>
+          <a:xfrm>
+            <a:off x="2411234" y="1965852"/>
+            <a:ext cx="4888902" cy="646331"/>
+          </a:xfrm>
+          <a:prstGeom prst="rect">
+            <a:avLst/>
+          </a:prstGeom>
+          <a:solidFill>
+            <a:schemeClr val="bg1"/>
+          </a:solidFill>
+          <a:ln>
+            <a:solidFill>
+              <a:schemeClr val="accent1">
+                <a:shade val="50000"/>
+              </a:schemeClr>
+            </a:solidFill>
+          </a:ln>
+        </p:spPr>
+        <p:txBody>
+          <a:bodyPr wrap="none" rtlCol="0">
+            <a:spAutoFit/>
+          </a:bodyPr>
+          <a:lstStyle/>
+          <a:p>
+            <a:r>
+              <a:rPr lang="en-US" dirty="0"/>
+              <a:t>The flexure mechanism built using Mechblocks </a:t>
+            </a:r>
+          </a:p>
+          <a:p>
+            <a:r>
+              <a:rPr lang="en-US" dirty="0"/>
+              <a:t>would be attached to this platform (Tool platform)</a:t>
+            </a:r>
+          </a:p>
+        </p:txBody>
+      </p:sp>
+      <p:cxnSp>
+        <p:nvCxnSpPr>
+          <p:cNvPr id="7" name="Straight Arrow Connector 6">
+            <a:extLst>
+              <a:ext uri="{FF2B5EF4-FFF2-40B4-BE49-F238E27FC236}">
+                <a16:creationId xmlns:a16="http://schemas.microsoft.com/office/drawing/2014/main" xmlns="" id="{FF780508-1E91-4EEA-9A05-1B3F942E01C8}"/>
+              </a:ext>
+            </a:extLst>
+          </p:cNvPr>
+          <p:cNvCxnSpPr>
+            <a:cxnSpLocks/>
+            <a:stCxn id="6" idx="2"/>
+          </p:cNvCxnSpPr>
+          <p:nvPr/>
+        </p:nvCxnSpPr>
+        <p:spPr>
+          <a:xfrm>
+            <a:off x="4855685" y="2612183"/>
+            <a:ext cx="322805" cy="677595"/>
+          </a:xfrm>
+          <a:prstGeom prst="straightConnector1">
+            <a:avLst/>
+          </a:prstGeom>
+          <a:ln w="25400">
+            <a:solidFill>
+              <a:srgbClr val="FF0000"/>
+            </a:solidFill>
+            <a:tailEnd type="triangle"/>
+          </a:ln>
+        </p:spPr>
+        <p:style>
+          <a:lnRef idx="1">
+            <a:schemeClr val="accent1"/>
+          </a:lnRef>
+          <a:fillRef idx="0">
+            <a:schemeClr val="accent1"/>
+          </a:fillRef>
+          <a:effectRef idx="0">
+            <a:schemeClr val="accent1"/>
+          </a:effectRef>
+          <a:fontRef idx="minor">
+            <a:schemeClr val="tx1"/>
+          </a:fontRef>
+        </p:style>
+      </p:cxnSp>
+      <p:sp>
+        <p:nvSpPr>
+          <p:cNvPr id="8" name="TextBox 7">
+            <a:extLst>
+              <a:ext uri="{FF2B5EF4-FFF2-40B4-BE49-F238E27FC236}">
+                <a16:creationId xmlns:a16="http://schemas.microsoft.com/office/drawing/2014/main" xmlns="" id="{9A59AE27-7C94-44A9-AFEA-D23D217DE6D5}"/>
+              </a:ext>
+            </a:extLst>
+          </p:cNvPr>
+          <p:cNvSpPr txBox="1"/>
+          <p:nvPr/>
+        </p:nvSpPr>
+        <p:spPr>
+          <a:xfrm>
+            <a:off x="8261684" y="5526282"/>
+            <a:ext cx="2959474" cy="923330"/>
+          </a:xfrm>
+          <a:prstGeom prst="rect">
+            <a:avLst/>
+          </a:prstGeom>
+          <a:solidFill>
+            <a:schemeClr val="bg1"/>
+          </a:solidFill>
+          <a:ln>
+            <a:solidFill>
+              <a:srgbClr val="FF0000"/>
+            </a:solidFill>
+          </a:ln>
+        </p:spPr>
+        <p:txBody>
+          <a:bodyPr wrap="square" rtlCol="0">
+            <a:spAutoFit/>
+          </a:bodyPr>
+          <a:lstStyle/>
+          <a:p>
+            <a:pPr algn="ctr"/>
+            <a:r>
+              <a:rPr lang="en-US" dirty="0"/>
+              <a:t>The material to be scribed will be placed on this surface</a:t>
+            </a:r>
+          </a:p>
+          <a:p>
+            <a:pPr algn="ctr"/>
+            <a:r>
+              <a:rPr lang="en-US" dirty="0"/>
+              <a:t>(specimen platform)</a:t>
+            </a:r>
+          </a:p>
+        </p:txBody>
+      </p:sp>
+      <p:cxnSp>
+        <p:nvCxnSpPr>
+          <p:cNvPr id="9" name="Straight Arrow Connector 8">
+            <a:extLst>
+              <a:ext uri="{FF2B5EF4-FFF2-40B4-BE49-F238E27FC236}">
+                <a16:creationId xmlns:a16="http://schemas.microsoft.com/office/drawing/2014/main" xmlns="" id="{BF71751D-6EC9-4673-A193-B164E1FD4D26}"/>
+              </a:ext>
+            </a:extLst>
+          </p:cNvPr>
+          <p:cNvCxnSpPr>
+            <a:cxnSpLocks/>
+            <a:stCxn id="8" idx="1"/>
+          </p:cNvCxnSpPr>
+          <p:nvPr/>
+        </p:nvCxnSpPr>
+        <p:spPr>
+          <a:xfrm flipH="1" flipV="1">
+            <a:off x="6344816" y="4898572"/>
+            <a:ext cx="1916868" cy="1089375"/>
+          </a:xfrm>
+          <a:prstGeom prst="straightConnector1">
+            <a:avLst/>
+          </a:prstGeom>
+          <a:ln w="38100">
+            <a:solidFill>
+              <a:srgbClr val="FF0000"/>
+            </a:solidFill>
+            <a:tailEnd type="triangle"/>
+          </a:ln>
+        </p:spPr>
+        <p:style>
+          <a:lnRef idx="1">
+            <a:schemeClr val="accent1"/>
+          </a:lnRef>
+          <a:fillRef idx="0">
+            <a:schemeClr val="accent1"/>
+          </a:fillRef>
+          <a:effectRef idx="0">
+            <a:schemeClr val="accent1"/>
+          </a:effectRef>
+          <a:fontRef idx="minor">
+            <a:schemeClr val="tx1"/>
+          </a:fontRef>
+        </p:style>
+      </p:cxnSp>
+      <p:cxnSp>
+        <p:nvCxnSpPr>
+          <p:cNvPr id="11" name="Straight Arrow Connector 10">
+            <a:extLst>
+              <a:ext uri="{FF2B5EF4-FFF2-40B4-BE49-F238E27FC236}">
+                <a16:creationId xmlns:a16="http://schemas.microsoft.com/office/drawing/2014/main" xmlns="" id="{3427DDE8-67E4-4C52-8537-F3F89BED9BC1}"/>
+              </a:ext>
+            </a:extLst>
+          </p:cNvPr>
+          <p:cNvCxnSpPr>
+            <a:cxnSpLocks/>
+          </p:cNvCxnSpPr>
+          <p:nvPr/>
+        </p:nvCxnSpPr>
+        <p:spPr>
+          <a:xfrm>
+            <a:off x="7249886" y="3289778"/>
+            <a:ext cx="1110343" cy="69242"/>
+          </a:xfrm>
+          <a:prstGeom prst="straightConnector1">
+            <a:avLst/>
+          </a:prstGeom>
+          <a:ln w="28575">
+            <a:solidFill>
+              <a:schemeClr val="tx1"/>
+            </a:solidFill>
+            <a:tailEnd type="triangle"/>
+          </a:ln>
+        </p:spPr>
+        <p:style>
+          <a:lnRef idx="1">
+            <a:schemeClr val="accent1"/>
+          </a:lnRef>
+          <a:fillRef idx="0">
+            <a:schemeClr val="accent1"/>
+          </a:fillRef>
+          <a:effectRef idx="0">
+            <a:schemeClr val="accent1"/>
+          </a:effectRef>
+          <a:fontRef idx="minor">
+            <a:schemeClr val="tx1"/>
+          </a:fontRef>
+        </p:style>
+      </p:cxnSp>
+      <p:sp>
+        <p:nvSpPr>
+          <p:cNvPr id="13" name="TextBox 12">
+            <a:extLst>
+              <a:ext uri="{FF2B5EF4-FFF2-40B4-BE49-F238E27FC236}">
+                <a16:creationId xmlns:a16="http://schemas.microsoft.com/office/drawing/2014/main" xmlns="" id="{7302189D-3F4F-46AD-8D85-C12EC035C9F8}"/>
+              </a:ext>
+            </a:extLst>
+          </p:cNvPr>
+          <p:cNvSpPr txBox="1"/>
+          <p:nvPr/>
+        </p:nvSpPr>
+        <p:spPr>
+          <a:xfrm>
+            <a:off x="7405873" y="2862734"/>
+            <a:ext cx="320922" cy="461665"/>
+          </a:xfrm>
+          <a:prstGeom prst="rect">
+            <a:avLst/>
+          </a:prstGeom>
+          <a:noFill/>
+        </p:spPr>
+        <p:txBody>
+          <a:bodyPr wrap="none" rtlCol="0">
+            <a:spAutoFit/>
+          </a:bodyPr>
+          <a:lstStyle/>
+          <a:p>
+            <a:r>
+              <a:rPr lang="en-US" sz="2400" i="1" dirty="0">
+                <a:latin typeface="Times New Roman" panose="02020603050405020304" pitchFamily="18" charset="0"/>
+                <a:cs typeface="Times New Roman" panose="02020603050405020304" pitchFamily="18" charset="0"/>
               </a:rPr>
-              <a:t>8/21/2020</a:t>
-            </a:fld>
-            <a:r>
-              <a:rPr lang="en-US" sz="1800" b="1">
-                <a:solidFill>
-                  <a:srgbClr val="FF0000"/>
-                </a:solidFill>
+              <a:t>x</a:t>
+            </a:r>
+          </a:p>
+        </p:txBody>
+      </p:sp>
+      <p:sp>
+        <p:nvSpPr>
+          <p:cNvPr id="14" name="TextBox 13">
+            <a:extLst>
+              <a:ext uri="{FF2B5EF4-FFF2-40B4-BE49-F238E27FC236}">
+                <a16:creationId xmlns:a16="http://schemas.microsoft.com/office/drawing/2014/main" xmlns="" id="{A91852CC-2D20-4B65-8E52-ED930B0184EF}"/>
+              </a:ext>
+            </a:extLst>
+          </p:cNvPr>
+          <p:cNvSpPr txBox="1"/>
+          <p:nvPr/>
+        </p:nvSpPr>
+        <p:spPr>
+          <a:xfrm>
+            <a:off x="5502891" y="4536432"/>
+            <a:ext cx="320922" cy="461665"/>
+          </a:xfrm>
+          <a:prstGeom prst="rect">
+            <a:avLst/>
+          </a:prstGeom>
+          <a:noFill/>
+        </p:spPr>
+        <p:txBody>
+          <a:bodyPr wrap="none" rtlCol="0">
+            <a:spAutoFit/>
+          </a:bodyPr>
+          <a:lstStyle/>
+          <a:p>
+            <a:r>
+              <a:rPr lang="en-US" sz="2400" i="1" dirty="0">
+                <a:latin typeface="Times New Roman" panose="02020603050405020304" pitchFamily="18" charset="0"/>
+                <a:cs typeface="Times New Roman" panose="02020603050405020304" pitchFamily="18" charset="0"/>
               </a:rPr>
-              <a:t>   </a:t>
-            </a:r>
-            <a:r>
-              <a:rPr lang="en-US" sz="1800" b="1" dirty="0">
-                <a:solidFill>
-                  <a:srgbClr val="FF0000"/>
-                </a:solidFill>
-              </a:rPr>
-              <a:t>PRELIMINARY</a:t>
-            </a:r>
-          </a:p>
-        </p:txBody>
-      </p:sp>
+              <a:t>y</a:t>
+            </a:r>
+          </a:p>
+        </p:txBody>
+      </p:sp>
+      <p:cxnSp>
+        <p:nvCxnSpPr>
+          <p:cNvPr id="15" name="Straight Arrow Connector 14">
+            <a:extLst>
+              <a:ext uri="{FF2B5EF4-FFF2-40B4-BE49-F238E27FC236}">
+                <a16:creationId xmlns:a16="http://schemas.microsoft.com/office/drawing/2014/main" xmlns="" id="{4E477CD6-9DF2-4050-9A7D-81CD074A4153}"/>
+              </a:ext>
+            </a:extLst>
+          </p:cNvPr>
+          <p:cNvCxnSpPr>
+            <a:cxnSpLocks/>
+          </p:cNvCxnSpPr>
+          <p:nvPr/>
+        </p:nvCxnSpPr>
+        <p:spPr>
+          <a:xfrm flipV="1">
+            <a:off x="5506414" y="4753703"/>
+            <a:ext cx="419831" cy="505493"/>
+          </a:xfrm>
+          <a:prstGeom prst="straightConnector1">
+            <a:avLst/>
+          </a:prstGeom>
+          <a:ln w="28575">
+            <a:solidFill>
+              <a:schemeClr val="tx1"/>
+            </a:solidFill>
+            <a:tailEnd type="triangle"/>
+          </a:ln>
+        </p:spPr>
+        <p:style>
+          <a:lnRef idx="1">
+            <a:schemeClr val="accent1"/>
+          </a:lnRef>
+          <a:fillRef idx="0">
+            <a:schemeClr val="accent1"/>
+          </a:fillRef>
+          <a:effectRef idx="0">
+            <a:schemeClr val="accent1"/>
+          </a:effectRef>
+          <a:fontRef idx="minor">
+            <a:schemeClr val="tx1"/>
+          </a:fontRef>
+        </p:style>
+      </p:cxnSp>
     </p:spTree>
     <p:extLst>
       <p:ext uri="{BB962C8B-B14F-4D97-AF65-F5344CB8AC3E}">
-        <p14:creationId xmlns:p14="http://schemas.microsoft.com/office/powerpoint/2010/main" val="2208804630"/>
+        <p14:creationId xmlns:p14="http://schemas.microsoft.com/office/powerpoint/2010/main" val="1304310183"/>
       </p:ext>
     </p:extLst>
   </p:cSld>
@@ -3438,46 +3778,262 @@
           <a:chExt cx="0" cy="0"/>
         </a:xfrm>
       </p:grpSpPr>
-      <p:sp>
-        <p:nvSpPr>
-          <p:cNvPr id="4" name="Title 3"/>
-          <p:cNvSpPr>
-            <a:spLocks noGrp="1"/>
-          </p:cNvSpPr>
-          <p:nvPr>
-            <p:ph type="title"/>
-          </p:nvPr>
-        </p:nvSpPr>
-        <p:spPr/>
-        <p:txBody>
-          <a:bodyPr/>
-          <a:lstStyle/>
-          <a:p>
-            <a:r>
-              <a:rPr lang="en-US" dirty="0"/>
-              <a:t>Overview of the stage that will be used in the second phase of the student challenge</a:t>
-            </a:r>
-          </a:p>
-        </p:txBody>
-      </p:sp>
+      <p:grpSp>
+        <p:nvGrpSpPr>
+          <p:cNvPr id="16" name="Group 15">
+            <a:extLst>
+              <a:ext uri="{FF2B5EF4-FFF2-40B4-BE49-F238E27FC236}">
+                <a16:creationId xmlns:a16="http://schemas.microsoft.com/office/drawing/2014/main" xmlns="" id="{831A7430-4A19-480B-BEEA-FAEBC0A0FA07}"/>
+              </a:ext>
+            </a:extLst>
+          </p:cNvPr>
+          <p:cNvGrpSpPr/>
+          <p:nvPr/>
+        </p:nvGrpSpPr>
+        <p:grpSpPr>
+          <a:xfrm>
+            <a:off x="138402" y="1071909"/>
+            <a:ext cx="7890588" cy="4976435"/>
+            <a:chOff x="1181100" y="505893"/>
+            <a:chExt cx="11010900" cy="6844459"/>
+          </a:xfrm>
+        </p:grpSpPr>
+        <p:pic>
+          <p:nvPicPr>
+            <p:cNvPr id="4" name="Picture 3">
+              <a:extLst>
+                <a:ext uri="{FF2B5EF4-FFF2-40B4-BE49-F238E27FC236}">
+                  <a16:creationId xmlns:a16="http://schemas.microsoft.com/office/drawing/2014/main" xmlns="" id="{C0B1C851-7FB1-4BF9-9BA1-42386D9193B9}"/>
+                </a:ext>
+              </a:extLst>
+            </p:cNvPr>
+            <p:cNvPicPr>
+              <a:picLocks noChangeAspect="1"/>
+            </p:cNvPicPr>
+            <p:nvPr/>
+          </p:nvPicPr>
+          <p:blipFill>
+            <a:blip r:embed="rId2"/>
+            <a:stretch>
+              <a:fillRect/>
+            </a:stretch>
+          </p:blipFill>
+          <p:spPr>
+            <a:xfrm>
+              <a:off x="1181100" y="505893"/>
+              <a:ext cx="11010900" cy="5286375"/>
+            </a:xfrm>
+            <a:prstGeom prst="rect">
+              <a:avLst/>
+            </a:prstGeom>
+          </p:spPr>
+        </p:pic>
+        <p:sp>
+          <p:nvSpPr>
+            <p:cNvPr id="6" name="TextBox 5">
+              <a:extLst>
+                <a:ext uri="{FF2B5EF4-FFF2-40B4-BE49-F238E27FC236}">
+                  <a16:creationId xmlns:a16="http://schemas.microsoft.com/office/drawing/2014/main" xmlns="" id="{9C8AC4E6-1F7D-4BF6-A7AA-DB13E48CBA67}"/>
+                </a:ext>
+              </a:extLst>
+            </p:cNvPr>
+            <p:cNvSpPr txBox="1"/>
+            <p:nvPr/>
+          </p:nvSpPr>
+          <p:spPr>
+            <a:xfrm>
+              <a:off x="8640148" y="2265601"/>
+              <a:ext cx="1168114" cy="507970"/>
+            </a:xfrm>
+            <a:prstGeom prst="rect">
+              <a:avLst/>
+            </a:prstGeom>
+            <a:noFill/>
+            <a:ln>
+              <a:noFill/>
+            </a:ln>
+          </p:spPr>
+          <p:txBody>
+            <a:bodyPr wrap="none" rtlCol="0">
+              <a:spAutoFit/>
+            </a:bodyPr>
+            <a:lstStyle/>
+            <a:p>
+              <a:r>
+                <a:rPr lang="en-US" dirty="0">
+                  <a:latin typeface="+mj-lt"/>
+                </a:rPr>
+                <a:t>51 mm</a:t>
+              </a:r>
+            </a:p>
+          </p:txBody>
+        </p:sp>
+        <p:sp>
+          <p:nvSpPr>
+            <p:cNvPr id="8" name="TextBox 7">
+              <a:extLst>
+                <a:ext uri="{FF2B5EF4-FFF2-40B4-BE49-F238E27FC236}">
+                  <a16:creationId xmlns:a16="http://schemas.microsoft.com/office/drawing/2014/main" xmlns="" id="{3D2A56FD-824D-448F-9D3A-8A07871FD97E}"/>
+                </a:ext>
+              </a:extLst>
+            </p:cNvPr>
+            <p:cNvSpPr txBox="1"/>
+            <p:nvPr/>
+          </p:nvSpPr>
+          <p:spPr>
+            <a:xfrm>
+              <a:off x="6686550" y="5530128"/>
+              <a:ext cx="4543719" cy="1820224"/>
+            </a:xfrm>
+            <a:prstGeom prst="rect">
+              <a:avLst/>
+            </a:prstGeom>
+            <a:solidFill>
+              <a:schemeClr val="bg1"/>
+            </a:solidFill>
+            <a:ln>
+              <a:solidFill>
+                <a:schemeClr val="tx1"/>
+              </a:solidFill>
+            </a:ln>
+          </p:spPr>
+          <p:txBody>
+            <a:bodyPr wrap="square" rtlCol="0">
+              <a:spAutoFit/>
+            </a:bodyPr>
+            <a:lstStyle/>
+            <a:p>
+              <a:pPr algn="just"/>
+              <a:r>
+                <a:rPr lang="en-US" sz="1600" dirty="0">
+                  <a:latin typeface="+mj-lt"/>
+                </a:rPr>
+                <a:t>The dimensions of the flexure mechanism must be designed in a way that the force tool attached to the mechanism makes contact at the specimen platform</a:t>
+              </a:r>
+            </a:p>
+          </p:txBody>
+        </p:sp>
+        <p:cxnSp>
+          <p:nvCxnSpPr>
+            <p:cNvPr id="9" name="Straight Arrow Connector 8">
+              <a:extLst>
+                <a:ext uri="{FF2B5EF4-FFF2-40B4-BE49-F238E27FC236}">
+                  <a16:creationId xmlns:a16="http://schemas.microsoft.com/office/drawing/2014/main" xmlns="" id="{C75187DA-EF68-4F33-9274-D35862EB77BB}"/>
+                </a:ext>
+              </a:extLst>
+            </p:cNvPr>
+            <p:cNvCxnSpPr>
+              <a:cxnSpLocks/>
+              <a:stCxn id="8" idx="0"/>
+            </p:cNvCxnSpPr>
+            <p:nvPr/>
+          </p:nvCxnSpPr>
+          <p:spPr>
+            <a:xfrm flipH="1" flipV="1">
+              <a:off x="7094524" y="3149081"/>
+              <a:ext cx="1863885" cy="2381047"/>
+            </a:xfrm>
+            <a:prstGeom prst="straightConnector1">
+              <a:avLst/>
+            </a:prstGeom>
+            <a:ln w="19050">
+              <a:solidFill>
+                <a:schemeClr val="tx1"/>
+              </a:solidFill>
+              <a:tailEnd type="triangle"/>
+            </a:ln>
+          </p:spPr>
+          <p:style>
+            <a:lnRef idx="1">
+              <a:schemeClr val="accent1"/>
+            </a:lnRef>
+            <a:fillRef idx="0">
+              <a:schemeClr val="accent1"/>
+            </a:fillRef>
+            <a:effectRef idx="0">
+              <a:schemeClr val="accent1"/>
+            </a:effectRef>
+            <a:fontRef idx="minor">
+              <a:schemeClr val="tx1"/>
+            </a:fontRef>
+          </p:style>
+        </p:cxnSp>
+        <p:cxnSp>
+          <p:nvCxnSpPr>
+            <p:cNvPr id="12" name="Straight Arrow Connector 11">
+              <a:extLst>
+                <a:ext uri="{FF2B5EF4-FFF2-40B4-BE49-F238E27FC236}">
+                  <a16:creationId xmlns:a16="http://schemas.microsoft.com/office/drawing/2014/main" xmlns="" id="{6961C4DD-E398-4C12-B69B-C1BF7050F974}"/>
+                </a:ext>
+              </a:extLst>
+            </p:cNvPr>
+            <p:cNvCxnSpPr>
+              <a:cxnSpLocks/>
+            </p:cNvCxnSpPr>
+            <p:nvPr/>
+          </p:nvCxnSpPr>
+          <p:spPr>
+            <a:xfrm>
+              <a:off x="8574833" y="1558212"/>
+              <a:ext cx="0" cy="1578837"/>
+            </a:xfrm>
+            <a:prstGeom prst="straightConnector1">
+              <a:avLst/>
+            </a:prstGeom>
+            <a:ln w="38100">
+              <a:solidFill>
+                <a:schemeClr val="tx1"/>
+              </a:solidFill>
+              <a:headEnd type="triangle"/>
+              <a:tailEnd type="triangle"/>
+            </a:ln>
+          </p:spPr>
+          <p:style>
+            <a:lnRef idx="1">
+              <a:schemeClr val="accent1"/>
+            </a:lnRef>
+            <a:fillRef idx="0">
+              <a:schemeClr val="accent1"/>
+            </a:fillRef>
+            <a:effectRef idx="0">
+              <a:schemeClr val="accent1"/>
+            </a:effectRef>
+            <a:fontRef idx="minor">
+              <a:schemeClr val="tx1"/>
+            </a:fontRef>
+          </p:style>
+        </p:cxnSp>
+      </p:grpSp>
       <p:pic>
         <p:nvPicPr>
-          <p:cNvPr id="5" name="Picture 4"/>
+          <p:cNvPr id="15" name="Picture 14" descr="A picture containing table, wooden, sitting, old&#10;&#10;Description automatically generated">
+            <a:extLst>
+              <a:ext uri="{FF2B5EF4-FFF2-40B4-BE49-F238E27FC236}">
+                <a16:creationId xmlns:a16="http://schemas.microsoft.com/office/drawing/2014/main" xmlns="" id="{DFA55392-ED9A-4E61-BDBB-0E1D1BC63B33}"/>
+              </a:ext>
+            </a:extLst>
+          </p:cNvPr>
           <p:cNvPicPr>
             <a:picLocks noChangeAspect="1"/>
           </p:cNvPicPr>
           <p:nvPr/>
         </p:nvPicPr>
         <p:blipFill>
-          <a:blip r:embed="rId2"/>
+          <a:blip r:embed="rId3" cstate="print">
+            <a:extLst>
+              <a:ext uri="{28A0092B-C50C-407E-A947-70E740481C1C}">
+                <a14:useLocalDpi xmlns:a14="http://schemas.microsoft.com/office/drawing/2010/main" val="0"/>
+              </a:ext>
+            </a:extLst>
+          </a:blip>
           <a:stretch>
             <a:fillRect/>
           </a:stretch>
         </p:blipFill>
         <p:spPr>
           <a:xfrm>
-            <a:off x="1987296" y="2401172"/>
-            <a:ext cx="7784592" cy="4007714"/>
+            <a:off x="8108305" y="1948677"/>
+            <a:ext cx="3590449" cy="4099666"/>
           </a:xfrm>
           <a:prstGeom prst="rect">
             <a:avLst/>
@@ -3486,28 +4042,25 @@
       </p:pic>
       <p:sp>
         <p:nvSpPr>
-          <p:cNvPr id="6" name="TextBox 5"/>
+          <p:cNvPr id="18" name="TextBox 17">
+            <a:extLst>
+              <a:ext uri="{FF2B5EF4-FFF2-40B4-BE49-F238E27FC236}">
+                <a16:creationId xmlns:a16="http://schemas.microsoft.com/office/drawing/2014/main" xmlns="" id="{31BDDB8E-24D5-4009-B113-8B48DC3C9C64}"/>
+              </a:ext>
+            </a:extLst>
+          </p:cNvPr>
           <p:cNvSpPr txBox="1"/>
           <p:nvPr/>
         </p:nvSpPr>
         <p:spPr>
           <a:xfrm>
-            <a:off x="2103120" y="1920240"/>
-            <a:ext cx="5404043" cy="369332"/>
+            <a:off x="9341901" y="1531254"/>
+            <a:ext cx="1123256" cy="369332"/>
           </a:xfrm>
           <a:prstGeom prst="rect">
             <a:avLst/>
           </a:prstGeom>
-          <a:solidFill>
-            <a:schemeClr val="bg1"/>
-          </a:solidFill>
-          <a:ln>
-            <a:solidFill>
-              <a:schemeClr val="accent1">
-                <a:shade val="50000"/>
-              </a:schemeClr>
-            </a:solidFill>
-          </a:ln>
+          <a:noFill/>
         </p:spPr>
         <p:txBody>
           <a:bodyPr wrap="none" rtlCol="0">
@@ -3516,87 +4069,47 @@
           <a:lstStyle/>
           <a:p>
             <a:r>
-              <a:rPr lang="en-US" dirty="0"/>
-              <a:t>The Z axis scribing head will be mounted on this surface</a:t>
-            </a:r>
-          </a:p>
-        </p:txBody>
-      </p:sp>
-      <p:cxnSp>
-        <p:nvCxnSpPr>
-          <p:cNvPr id="8" name="Straight Arrow Connector 7"/>
-          <p:cNvCxnSpPr>
-            <a:stCxn id="6" idx="2"/>
-          </p:cNvCxnSpPr>
+              <a:rPr lang="en-US" u="sng" dirty="0">
+                <a:latin typeface="+mj-lt"/>
+              </a:rPr>
+              <a:t>Force tool</a:t>
+            </a:r>
+          </a:p>
+        </p:txBody>
+      </p:sp>
+      <p:sp>
+        <p:nvSpPr>
+          <p:cNvPr id="20" name="TextBox 19">
+            <a:extLst>
+              <a:ext uri="{FF2B5EF4-FFF2-40B4-BE49-F238E27FC236}">
+                <a16:creationId xmlns:a16="http://schemas.microsoft.com/office/drawing/2014/main" xmlns="" id="{BD44F9B6-6A73-432A-8BD3-06138B593663}"/>
+              </a:ext>
+            </a:extLst>
+          </p:cNvPr>
+          <p:cNvSpPr txBox="1"/>
           <p:nvPr/>
-        </p:nvCxnSpPr>
+        </p:nvSpPr>
         <p:spPr>
           <a:xfrm>
-            <a:off x="4805142" y="2289572"/>
-            <a:ext cx="605631" cy="934891"/>
+            <a:off x="138402" y="265338"/>
+            <a:ext cx="10493194" cy="523220"/>
           </a:xfrm>
-          <a:prstGeom prst="straightConnector1">
+          <a:prstGeom prst="rect">
             <a:avLst/>
           </a:prstGeom>
-          <a:ln w="25400">
-            <a:solidFill>
-              <a:srgbClr val="FF0000"/>
-            </a:solidFill>
-            <a:tailEnd type="triangle"/>
-          </a:ln>
+          <a:noFill/>
         </p:spPr>
-        <p:style>
-          <a:lnRef idx="1">
-            <a:schemeClr val="accent1"/>
-          </a:lnRef>
-          <a:fillRef idx="0">
-            <a:schemeClr val="accent1"/>
-          </a:fillRef>
-          <a:effectRef idx="0">
-            <a:schemeClr val="accent1"/>
-          </a:effectRef>
-          <a:fontRef idx="minor">
-            <a:schemeClr val="tx1"/>
-          </a:fontRef>
-        </p:style>
-      </p:cxnSp>
-      <p:sp>
-        <p:nvSpPr>
-          <p:cNvPr id="2" name="Date Placeholder 1">
-            <a:extLst>
-              <a:ext uri="{FF2B5EF4-FFF2-40B4-BE49-F238E27FC236}">
-                <a16:creationId xmlns:a16="http://schemas.microsoft.com/office/drawing/2014/main" id="{3CE0D794-D7D0-446C-81E2-C635C565026E}"/>
-              </a:ext>
-            </a:extLst>
-          </p:cNvPr>
-          <p:cNvSpPr>
-            <a:spLocks noGrp="1"/>
-          </p:cNvSpPr>
-          <p:nvPr>
-            <p:ph type="dt" sz="half" idx="10"/>
-          </p:nvPr>
-        </p:nvSpPr>
-        <p:spPr/>
-        <p:txBody>
-          <a:bodyPr/>
-          <a:lstStyle/>
-          <a:p>
-            <a:fld id="{41F944AB-1521-40B9-8458-39C9D80A03E1}" type="datetime1">
-              <a:rPr lang="en-US" b="1">
-                <a:solidFill>
-                  <a:srgbClr val="FF0000"/>
-                </a:solidFill>
+        <p:txBody>
+          <a:bodyPr wrap="none" rtlCol="0">
+            <a:spAutoFit/>
+          </a:bodyPr>
+          <a:lstStyle/>
+          <a:p>
+            <a:r>
+              <a:rPr lang="en-US" sz="2800" dirty="0">
+                <a:latin typeface="+mj-lt"/>
               </a:rPr>
-              <a:pPr/>
-              <a:t>8/21/2020</a:t>
-            </a:fld>
-            <a:r>
-              <a:rPr lang="en-US" b="1" dirty="0">
-                <a:solidFill>
-                  <a:srgbClr val="FF0000"/>
-                </a:solidFill>
-              </a:rPr>
-              <a:t>   PRELIMINARY</a:t>
+              <a:t>Dimensional constrain of the flexure mechanism to be designed in 2020</a:t>
             </a:r>
           </a:p>
         </p:txBody>
@@ -3604,7 +4117,7 @@
     </p:spTree>
     <p:extLst>
       <p:ext uri="{BB962C8B-B14F-4D97-AF65-F5344CB8AC3E}">
-        <p14:creationId xmlns:p14="http://schemas.microsoft.com/office/powerpoint/2010/main" val="3225488525"/>
+        <p14:creationId xmlns:p14="http://schemas.microsoft.com/office/powerpoint/2010/main" val="4003588877"/>
       </p:ext>
     </p:extLst>
   </p:cSld>
@@ -3631,72 +4144,272 @@
           <a:chExt cx="0" cy="0"/>
         </a:xfrm>
       </p:grpSpPr>
-      <p:sp>
-        <p:nvSpPr>
-          <p:cNvPr id="2" name="Title 1"/>
-          <p:cNvSpPr>
-            <a:spLocks noGrp="1"/>
-          </p:cNvSpPr>
-          <p:nvPr>
-            <p:ph type="title"/>
-          </p:nvPr>
-        </p:nvSpPr>
-        <p:spPr/>
-        <p:txBody>
-          <a:bodyPr>
-            <a:normAutofit fontScale="90000"/>
-          </a:bodyPr>
-          <a:lstStyle/>
-          <a:p>
-            <a:r>
-              <a:rPr lang="en-US" dirty="0"/>
-              <a:t>The hole pattern on the carriage is identical to the hole pattern on the </a:t>
-            </a:r>
-            <a:r>
-              <a:rPr lang="en-US" dirty="0" err="1"/>
-              <a:t>Mech</a:t>
-            </a:r>
-            <a:r>
-              <a:rPr lang="en-US" dirty="0"/>
-              <a:t>-blocks (0.500 inch or 12.70mm) the threaded holes are M6x1.0</a:t>
-            </a:r>
-          </a:p>
-        </p:txBody>
-      </p:sp>
-      <p:pic>
-        <p:nvPicPr>
-          <p:cNvPr id="3" name="Picture 2"/>
-          <p:cNvPicPr>
-            <a:picLocks noChangeAspect="1"/>
-          </p:cNvPicPr>
+      <p:grpSp>
+        <p:nvGrpSpPr>
+          <p:cNvPr id="17" name="Group 16">
+            <a:extLst>
+              <a:ext uri="{FF2B5EF4-FFF2-40B4-BE49-F238E27FC236}">
+                <a16:creationId xmlns:a16="http://schemas.microsoft.com/office/drawing/2014/main" xmlns="" id="{A4727EFA-2ACD-4A24-A772-3493254E1D40}"/>
+              </a:ext>
+            </a:extLst>
+          </p:cNvPr>
+          <p:cNvGrpSpPr/>
           <p:nvPr/>
-        </p:nvPicPr>
-        <p:blipFill>
-          <a:blip r:embed="rId2"/>
-          <a:stretch>
-            <a:fillRect/>
-          </a:stretch>
-        </p:blipFill>
+        </p:nvGrpSpPr>
+        <p:grpSpPr>
+          <a:xfrm>
+            <a:off x="186612" y="1390261"/>
+            <a:ext cx="6578082" cy="4816053"/>
+            <a:chOff x="1390650" y="157162"/>
+            <a:chExt cx="8815205" cy="6543675"/>
+          </a:xfrm>
+        </p:grpSpPr>
+        <p:pic>
+          <p:nvPicPr>
+            <p:cNvPr id="4" name="Picture 3">
+              <a:extLst>
+                <a:ext uri="{FF2B5EF4-FFF2-40B4-BE49-F238E27FC236}">
+                  <a16:creationId xmlns:a16="http://schemas.microsoft.com/office/drawing/2014/main" xmlns="" id="{431DF9FE-58EE-4E05-BF6E-B751B99E14FE}"/>
+                </a:ext>
+              </a:extLst>
+            </p:cNvPr>
+            <p:cNvPicPr>
+              <a:picLocks noChangeAspect="1"/>
+            </p:cNvPicPr>
+            <p:nvPr/>
+          </p:nvPicPr>
+          <p:blipFill rotWithShape="1">
+            <a:blip r:embed="rId2"/>
+            <a:srcRect r="6328"/>
+            <a:stretch/>
+          </p:blipFill>
+          <p:spPr>
+            <a:xfrm>
+              <a:off x="1390650" y="157162"/>
+              <a:ext cx="8815205" cy="6543675"/>
+            </a:xfrm>
+            <a:prstGeom prst="rect">
+              <a:avLst/>
+            </a:prstGeom>
+          </p:spPr>
+        </p:pic>
+        <p:sp>
+          <p:nvSpPr>
+            <p:cNvPr id="7" name="TextBox 6">
+              <a:extLst>
+                <a:ext uri="{FF2B5EF4-FFF2-40B4-BE49-F238E27FC236}">
+                  <a16:creationId xmlns:a16="http://schemas.microsoft.com/office/drawing/2014/main" xmlns="" id="{32E63AE2-7BA1-408F-B8CF-7E3E2B7837A2}"/>
+                </a:ext>
+              </a:extLst>
+            </p:cNvPr>
+            <p:cNvSpPr txBox="1"/>
+            <p:nvPr/>
+          </p:nvSpPr>
+          <p:spPr>
+            <a:xfrm>
+              <a:off x="5524264" y="3351961"/>
+              <a:ext cx="1132041" cy="369332"/>
+            </a:xfrm>
+            <a:prstGeom prst="rect">
+              <a:avLst/>
+            </a:prstGeom>
+            <a:noFill/>
+            <a:ln>
+              <a:noFill/>
+            </a:ln>
+          </p:spPr>
+          <p:txBody>
+            <a:bodyPr wrap="none" rtlCol="0">
+              <a:spAutoFit/>
+            </a:bodyPr>
+            <a:lstStyle/>
+            <a:p>
+              <a:r>
+                <a:rPr lang="en-US" dirty="0"/>
+                <a:t>114.3 mm</a:t>
+              </a:r>
+            </a:p>
+          </p:txBody>
+        </p:sp>
+        <p:sp>
+          <p:nvSpPr>
+            <p:cNvPr id="9" name="TextBox 8">
+              <a:extLst>
+                <a:ext uri="{FF2B5EF4-FFF2-40B4-BE49-F238E27FC236}">
+                  <a16:creationId xmlns:a16="http://schemas.microsoft.com/office/drawing/2014/main" xmlns="" id="{EAD4A8BD-DDDA-402B-A3C9-CFEB569C5DBB}"/>
+                </a:ext>
+              </a:extLst>
+            </p:cNvPr>
+            <p:cNvSpPr txBox="1"/>
+            <p:nvPr/>
+          </p:nvSpPr>
+          <p:spPr>
+            <a:xfrm>
+              <a:off x="5847608" y="2658597"/>
+              <a:ext cx="1132042" cy="369332"/>
+            </a:xfrm>
+            <a:prstGeom prst="rect">
+              <a:avLst/>
+            </a:prstGeom>
+            <a:noFill/>
+          </p:spPr>
+          <p:txBody>
+            <a:bodyPr wrap="none" rtlCol="0">
+              <a:spAutoFit/>
+            </a:bodyPr>
+            <a:lstStyle/>
+            <a:p>
+              <a:r>
+                <a:rPr lang="en-US" dirty="0"/>
+                <a:t>74.55 mm</a:t>
+              </a:r>
+            </a:p>
+          </p:txBody>
+        </p:sp>
+        <p:cxnSp>
+          <p:nvCxnSpPr>
+            <p:cNvPr id="12" name="Straight Arrow Connector 11">
+              <a:extLst>
+                <a:ext uri="{FF2B5EF4-FFF2-40B4-BE49-F238E27FC236}">
+                  <a16:creationId xmlns:a16="http://schemas.microsoft.com/office/drawing/2014/main" xmlns="" id="{54641672-C91E-4960-90F1-A47C2187A28D}"/>
+                </a:ext>
+              </a:extLst>
+            </p:cNvPr>
+            <p:cNvCxnSpPr>
+              <a:cxnSpLocks/>
+            </p:cNvCxnSpPr>
+            <p:nvPr/>
+          </p:nvCxnSpPr>
+          <p:spPr>
+            <a:xfrm>
+              <a:off x="7302993" y="2281652"/>
+              <a:ext cx="0" cy="2085075"/>
+            </a:xfrm>
+            <a:prstGeom prst="straightConnector1">
+              <a:avLst/>
+            </a:prstGeom>
+            <a:ln w="38100">
+              <a:solidFill>
+                <a:schemeClr val="tx1"/>
+              </a:solidFill>
+              <a:headEnd type="triangle"/>
+              <a:tailEnd type="triangle"/>
+            </a:ln>
+          </p:spPr>
+          <p:style>
+            <a:lnRef idx="1">
+              <a:schemeClr val="accent1"/>
+            </a:lnRef>
+            <a:fillRef idx="0">
+              <a:schemeClr val="accent1"/>
+            </a:fillRef>
+            <a:effectRef idx="0">
+              <a:schemeClr val="accent1"/>
+            </a:effectRef>
+            <a:fontRef idx="minor">
+              <a:schemeClr val="tx1"/>
+            </a:fontRef>
+          </p:style>
+        </p:cxnSp>
+        <p:cxnSp>
+          <p:nvCxnSpPr>
+            <p:cNvPr id="13" name="Straight Arrow Connector 12">
+              <a:extLst>
+                <a:ext uri="{FF2B5EF4-FFF2-40B4-BE49-F238E27FC236}">
+                  <a16:creationId xmlns:a16="http://schemas.microsoft.com/office/drawing/2014/main" xmlns="" id="{4028F882-6542-4300-8A01-423D6EEBE9E9}"/>
+                </a:ext>
+              </a:extLst>
+            </p:cNvPr>
+            <p:cNvCxnSpPr>
+              <a:cxnSpLocks/>
+            </p:cNvCxnSpPr>
+            <p:nvPr/>
+          </p:nvCxnSpPr>
+          <p:spPr>
+            <a:xfrm flipH="1">
+              <a:off x="5038531" y="3351961"/>
+              <a:ext cx="3135085" cy="0"/>
+            </a:xfrm>
+            <a:prstGeom prst="straightConnector1">
+              <a:avLst/>
+            </a:prstGeom>
+            <a:ln w="38100">
+              <a:solidFill>
+                <a:schemeClr val="tx1"/>
+              </a:solidFill>
+              <a:headEnd type="triangle"/>
+              <a:tailEnd type="triangle"/>
+            </a:ln>
+          </p:spPr>
+          <p:style>
+            <a:lnRef idx="1">
+              <a:schemeClr val="accent1"/>
+            </a:lnRef>
+            <a:fillRef idx="0">
+              <a:schemeClr val="accent1"/>
+            </a:fillRef>
+            <a:effectRef idx="0">
+              <a:schemeClr val="accent1"/>
+            </a:effectRef>
+            <a:fontRef idx="minor">
+              <a:schemeClr val="tx1"/>
+            </a:fontRef>
+          </p:style>
+        </p:cxnSp>
+      </p:grpSp>
+      <p:sp>
+        <p:nvSpPr>
+          <p:cNvPr id="18" name="TextBox 17">
+            <a:extLst>
+              <a:ext uri="{FF2B5EF4-FFF2-40B4-BE49-F238E27FC236}">
+                <a16:creationId xmlns:a16="http://schemas.microsoft.com/office/drawing/2014/main" xmlns="" id="{ED8008FD-356D-4821-A23E-AD86416700B0}"/>
+              </a:ext>
+            </a:extLst>
+          </p:cNvPr>
+          <p:cNvSpPr txBox="1"/>
+          <p:nvPr/>
+        </p:nvSpPr>
         <p:spPr>
           <a:xfrm>
-            <a:off x="2905831" y="1958296"/>
-            <a:ext cx="5591901" cy="4542193"/>
+            <a:off x="110411" y="466425"/>
+            <a:ext cx="10493194" cy="523220"/>
           </a:xfrm>
           <a:prstGeom prst="rect">
             <a:avLst/>
           </a:prstGeom>
+          <a:noFill/>
         </p:spPr>
-      </p:pic>
-      <p:sp>
-        <p:nvSpPr>
-          <p:cNvPr id="4" name="TextBox 3"/>
+        <p:txBody>
+          <a:bodyPr wrap="none" rtlCol="0">
+            <a:spAutoFit/>
+          </a:bodyPr>
+          <a:lstStyle/>
+          <a:p>
+            <a:r>
+              <a:rPr lang="en-US" sz="2800" dirty="0">
+                <a:latin typeface="+mj-lt"/>
+              </a:rPr>
+              <a:t>Dimensional constrain of the flexure mechanism to be designed in 2020</a:t>
+            </a:r>
+          </a:p>
+        </p:txBody>
+      </p:sp>
+      <p:sp>
+        <p:nvSpPr>
+          <p:cNvPr id="20" name="TextBox 19">
+            <a:extLst>
+              <a:ext uri="{FF2B5EF4-FFF2-40B4-BE49-F238E27FC236}">
+                <a16:creationId xmlns:a16="http://schemas.microsoft.com/office/drawing/2014/main" xmlns="" id="{E487B255-8F82-44B3-AA77-B0384BABE106}"/>
+              </a:ext>
+            </a:extLst>
+          </p:cNvPr>
           <p:cNvSpPr txBox="1"/>
           <p:nvPr/>
         </p:nvSpPr>
         <p:spPr>
           <a:xfrm>
-            <a:off x="8752113" y="2296312"/>
-            <a:ext cx="2289438" cy="2031325"/>
+            <a:off x="7005979" y="4841415"/>
+            <a:ext cx="3256102" cy="830997"/>
           </a:xfrm>
           <a:prstGeom prst="rect">
             <a:avLst/>
@@ -3706,9 +4419,7 @@
           </a:solidFill>
           <a:ln>
             <a:solidFill>
-              <a:schemeClr val="accent1">
-                <a:shade val="50000"/>
-              </a:schemeClr>
+              <a:schemeClr val="tx1"/>
             </a:solidFill>
           </a:ln>
         </p:spPr>
@@ -3718,38 +4429,48 @@
           </a:bodyPr>
           <a:lstStyle/>
           <a:p>
-            <a:r>
-              <a:rPr lang="en-US" dirty="0"/>
-              <a:t>Example of </a:t>
-            </a:r>
-            <a:r>
-              <a:rPr lang="en-US" dirty="0" err="1"/>
-              <a:t>Mech</a:t>
-            </a:r>
-            <a:r>
-              <a:rPr lang="en-US" dirty="0"/>
-              <a:t> blocks hole pitch compared to the hole pitch on the carriage. Build your z axis scribe head to fit on this stage</a:t>
+            <a:pPr algn="just"/>
+            <a:r>
+              <a:rPr lang="en-US" sz="1600" dirty="0">
+                <a:latin typeface="+mj-lt"/>
+              </a:rPr>
+              <a:t>Are the teams required to design their mechanism in a way it fits inside this rectangle? </a:t>
+            </a:r>
+            <a:r>
+              <a:rPr lang="en-US" sz="1600" b="1" dirty="0">
+                <a:latin typeface="+mj-lt"/>
+              </a:rPr>
+              <a:t>KA</a:t>
             </a:r>
           </a:p>
         </p:txBody>
       </p:sp>
       <p:cxnSp>
         <p:nvCxnSpPr>
-          <p:cNvPr id="6" name="Straight Arrow Connector 5"/>
+          <p:cNvPr id="21" name="Straight Arrow Connector 20">
+            <a:extLst>
+              <a:ext uri="{FF2B5EF4-FFF2-40B4-BE49-F238E27FC236}">
+                <a16:creationId xmlns:a16="http://schemas.microsoft.com/office/drawing/2014/main" xmlns="" id="{DD7AF51A-C257-461F-BCE0-2CBCC8468B65}"/>
+              </a:ext>
+            </a:extLst>
+          </p:cNvPr>
           <p:cNvCxnSpPr>
-            <a:stCxn id="4" idx="1"/>
+            <a:cxnSpLocks/>
           </p:cNvCxnSpPr>
           <p:nvPr/>
         </p:nvCxnSpPr>
         <p:spPr>
           <a:xfrm flipH="1" flipV="1">
-            <a:off x="5701781" y="3018209"/>
-            <a:ext cx="3050332" cy="293766"/>
+            <a:off x="4952617" y="4142205"/>
+            <a:ext cx="2053362" cy="1129591"/>
           </a:xfrm>
           <a:prstGeom prst="straightConnector1">
             <a:avLst/>
           </a:prstGeom>
-          <a:ln w="34925">
+          <a:ln w="19050">
+            <a:solidFill>
+              <a:schemeClr val="tx1"/>
+            </a:solidFill>
             <a:tailEnd type="triangle"/>
           </a:ln>
         </p:spPr>
@@ -3768,89 +4489,10 @@
           </a:fontRef>
         </p:style>
       </p:cxnSp>
-      <p:cxnSp>
-        <p:nvCxnSpPr>
-          <p:cNvPr id="8" name="Straight Arrow Connector 7"/>
-          <p:cNvCxnSpPr>
-            <a:stCxn id="4" idx="1"/>
-          </p:cNvCxnSpPr>
-          <p:nvPr/>
-        </p:nvCxnSpPr>
-        <p:spPr>
-          <a:xfrm flipH="1">
-            <a:off x="5603279" y="3311975"/>
-            <a:ext cx="3148834" cy="1768789"/>
-          </a:xfrm>
-          <a:prstGeom prst="straightConnector1">
-            <a:avLst/>
-          </a:prstGeom>
-          <a:ln w="34925">
-            <a:tailEnd type="triangle"/>
-          </a:ln>
-        </p:spPr>
-        <p:style>
-          <a:lnRef idx="1">
-            <a:schemeClr val="accent1"/>
-          </a:lnRef>
-          <a:fillRef idx="0">
-            <a:schemeClr val="accent1"/>
-          </a:fillRef>
-          <a:effectRef idx="0">
-            <a:schemeClr val="accent1"/>
-          </a:effectRef>
-          <a:fontRef idx="minor">
-            <a:schemeClr val="tx1"/>
-          </a:fontRef>
-        </p:style>
-      </p:cxnSp>
-      <p:sp>
-        <p:nvSpPr>
-          <p:cNvPr id="5" name="Date Placeholder 4">
-            <a:extLst>
-              <a:ext uri="{FF2B5EF4-FFF2-40B4-BE49-F238E27FC236}">
-                <a16:creationId xmlns:a16="http://schemas.microsoft.com/office/drawing/2014/main" id="{9A6B0568-36B1-4341-98E3-BDA3F1C7CCF4}"/>
-              </a:ext>
-            </a:extLst>
-          </p:cNvPr>
-          <p:cNvSpPr>
-            <a:spLocks noGrp="1"/>
-          </p:cNvSpPr>
-          <p:nvPr>
-            <p:ph type="dt" sz="half" idx="10"/>
-          </p:nvPr>
-        </p:nvSpPr>
-        <p:spPr/>
-        <p:txBody>
-          <a:bodyPr/>
-          <a:lstStyle/>
-          <a:p>
-            <a:fld id="{41F944AB-1521-40B9-8458-39C9D80A03E1}" type="datetime1">
-              <a:rPr lang="en-US" b="1">
-                <a:solidFill>
-                  <a:srgbClr val="FF0000"/>
-                </a:solidFill>
-              </a:rPr>
-              <a:pPr/>
-              <a:t>8/21/2020</a:t>
-            </a:fld>
-            <a:r>
-              <a:rPr lang="en-US" b="1" dirty="0">
-                <a:solidFill>
-                  <a:srgbClr val="FF0000"/>
-                </a:solidFill>
-              </a:rPr>
-              <a:t>   PRELIMINARY</a:t>
-            </a:r>
-          </a:p>
-          <a:p>
-            <a:endParaRPr lang="en-US" dirty="0"/>
-          </a:p>
-        </p:txBody>
-      </p:sp>
     </p:spTree>
     <p:extLst>
       <p:ext uri="{BB962C8B-B14F-4D97-AF65-F5344CB8AC3E}">
-        <p14:creationId xmlns:p14="http://schemas.microsoft.com/office/powerpoint/2010/main" val="528176991"/>
+        <p14:creationId xmlns:p14="http://schemas.microsoft.com/office/powerpoint/2010/main" val="4033328354"/>
       </p:ext>
     </p:extLst>
   </p:cSld>
@@ -3861,130 +4503,6 @@
 </file>
 
 <file path=ppt/slides/slide4.xml><?xml version="1.0" encoding="utf-8"?>
-<p:sld xmlns:a="http://schemas.openxmlformats.org/drawingml/2006/main" xmlns:r="http://schemas.openxmlformats.org/officeDocument/2006/relationships" xmlns:p="http://schemas.openxmlformats.org/presentationml/2006/main">
-  <p:cSld>
-    <p:spTree>
-      <p:nvGrpSpPr>
-        <p:cNvPr id="1" name=""/>
-        <p:cNvGrpSpPr/>
-        <p:nvPr/>
-      </p:nvGrpSpPr>
-      <p:grpSpPr>
-        <a:xfrm>
-          <a:off x="0" y="0"/>
-          <a:ext cx="0" cy="0"/>
-          <a:chOff x="0" y="0"/>
-          <a:chExt cx="0" cy="0"/>
-        </a:xfrm>
-      </p:grpSpPr>
-      <p:pic>
-        <p:nvPicPr>
-          <p:cNvPr id="3" name="Picture 2"/>
-          <p:cNvPicPr>
-            <a:picLocks noChangeAspect="1"/>
-          </p:cNvPicPr>
-          <p:nvPr/>
-        </p:nvPicPr>
-        <p:blipFill>
-          <a:blip r:embed="rId2"/>
-          <a:stretch>
-            <a:fillRect/>
-          </a:stretch>
-        </p:blipFill>
-        <p:spPr>
-          <a:xfrm>
-            <a:off x="5225143" y="304641"/>
-            <a:ext cx="6476319" cy="6487095"/>
-          </a:xfrm>
-          <a:prstGeom prst="rect">
-            <a:avLst/>
-          </a:prstGeom>
-        </p:spPr>
-      </p:pic>
-      <p:sp>
-        <p:nvSpPr>
-          <p:cNvPr id="6" name="TextBox 5"/>
-          <p:cNvSpPr txBox="1"/>
-          <p:nvPr/>
-        </p:nvSpPr>
-        <p:spPr>
-          <a:xfrm>
-            <a:off x="1196283" y="1278785"/>
-            <a:ext cx="2695073" cy="1754326"/>
-          </a:xfrm>
-          <a:prstGeom prst="rect">
-            <a:avLst/>
-          </a:prstGeom>
-          <a:noFill/>
-        </p:spPr>
-        <p:txBody>
-          <a:bodyPr wrap="square" rtlCol="0">
-            <a:spAutoFit/>
-          </a:bodyPr>
-          <a:lstStyle/>
-          <a:p>
-            <a:r>
-              <a:rPr lang="en-US" dirty="0"/>
-              <a:t>Detailed drawing of the top carriage plate were the Z-axis scribe head will be mounted. This drawing will be provided to each team in PDF form</a:t>
-            </a:r>
-          </a:p>
-        </p:txBody>
-      </p:sp>
-      <p:sp>
-        <p:nvSpPr>
-          <p:cNvPr id="2" name="Date Placeholder 1">
-            <a:extLst>
-              <a:ext uri="{FF2B5EF4-FFF2-40B4-BE49-F238E27FC236}">
-                <a16:creationId xmlns:a16="http://schemas.microsoft.com/office/drawing/2014/main" id="{EF9411CF-0C39-40CE-9283-43CB98041347}"/>
-              </a:ext>
-            </a:extLst>
-          </p:cNvPr>
-          <p:cNvSpPr>
-            <a:spLocks noGrp="1"/>
-          </p:cNvSpPr>
-          <p:nvPr>
-            <p:ph type="dt" sz="half" idx="10"/>
-          </p:nvPr>
-        </p:nvSpPr>
-        <p:spPr/>
-        <p:txBody>
-          <a:bodyPr/>
-          <a:lstStyle/>
-          <a:p>
-            <a:fld id="{41F944AB-1521-40B9-8458-39C9D80A03E1}" type="datetime1">
-              <a:rPr lang="en-US" b="1">
-                <a:solidFill>
-                  <a:srgbClr val="FF0000"/>
-                </a:solidFill>
-              </a:rPr>
-              <a:pPr/>
-              <a:t>8/21/2020</a:t>
-            </a:fld>
-            <a:r>
-              <a:rPr lang="en-US" b="1" dirty="0">
-                <a:solidFill>
-                  <a:srgbClr val="FF0000"/>
-                </a:solidFill>
-              </a:rPr>
-              <a:t>   PRELIMINARY</a:t>
-            </a:r>
-          </a:p>
-        </p:txBody>
-      </p:sp>
-    </p:spTree>
-    <p:extLst>
-      <p:ext uri="{BB962C8B-B14F-4D97-AF65-F5344CB8AC3E}">
-        <p14:creationId xmlns:p14="http://schemas.microsoft.com/office/powerpoint/2010/main" val="1073960084"/>
-      </p:ext>
-    </p:extLst>
-  </p:cSld>
-  <p:clrMapOvr>
-    <a:masterClrMapping/>
-  </p:clrMapOvr>
-</p:sld>
-</file>
-
-<file path=ppt/slides/slide5.xml><?xml version="1.0" encoding="utf-8"?>
 <p:sld xmlns:a="http://schemas.openxmlformats.org/drawingml/2006/main" xmlns:r="http://schemas.openxmlformats.org/officeDocument/2006/relationships" xmlns:p="http://schemas.openxmlformats.org/presentationml/2006/main">
   <p:cSld>
     <p:spTree>
@@ -4017,8 +4535,8 @@
         </p:blipFill>
         <p:spPr>
           <a:xfrm>
-            <a:off x="590550" y="785812"/>
-            <a:ext cx="11010900" cy="5286375"/>
+            <a:off x="398170" y="966484"/>
+            <a:ext cx="5568387" cy="3599727"/>
           </a:xfrm>
           <a:prstGeom prst="rect">
             <a:avLst/>
@@ -4027,14 +4545,144 @@
       </p:pic>
       <p:sp>
         <p:nvSpPr>
+          <p:cNvPr id="4" name="TextBox 3">
+            <a:extLst>
+              <a:ext uri="{FF2B5EF4-FFF2-40B4-BE49-F238E27FC236}">
+                <a16:creationId xmlns:a16="http://schemas.microsoft.com/office/drawing/2014/main" xmlns="" id="{76BF044A-44C8-47EC-9120-9FBFA07DBBE3}"/>
+              </a:ext>
+            </a:extLst>
+          </p:cNvPr>
+          <p:cNvSpPr txBox="1"/>
+          <p:nvPr/>
+        </p:nvSpPr>
+        <p:spPr>
+          <a:xfrm>
+            <a:off x="279427" y="297563"/>
+            <a:ext cx="7454990" cy="461665"/>
+          </a:xfrm>
+          <a:prstGeom prst="rect">
+            <a:avLst/>
+          </a:prstGeom>
+          <a:noFill/>
+        </p:spPr>
+        <p:txBody>
+          <a:bodyPr wrap="none" rtlCol="0">
+            <a:spAutoFit/>
+          </a:bodyPr>
+          <a:lstStyle/>
+          <a:p>
+            <a:r>
+              <a:rPr lang="en-US" sz="2400" dirty="0">
+                <a:latin typeface="+mj-lt"/>
+              </a:rPr>
+              <a:t>To emulate dimensional constraints of the air bearing stage</a:t>
+            </a:r>
+          </a:p>
+        </p:txBody>
+      </p:sp>
+      <p:sp>
+        <p:nvSpPr>
+          <p:cNvPr id="6" name="TextBox 5">
+            <a:extLst>
+              <a:ext uri="{FF2B5EF4-FFF2-40B4-BE49-F238E27FC236}">
+                <a16:creationId xmlns:a16="http://schemas.microsoft.com/office/drawing/2014/main" xmlns="" id="{B9F9F18A-9404-4FF6-93C6-68282E8769F9}"/>
+              </a:ext>
+            </a:extLst>
+          </p:cNvPr>
+          <p:cNvSpPr txBox="1"/>
+          <p:nvPr/>
+        </p:nvSpPr>
+        <p:spPr>
+          <a:xfrm>
+            <a:off x="528144" y="4992351"/>
+            <a:ext cx="4821169" cy="1200329"/>
+          </a:xfrm>
+          <a:prstGeom prst="rect">
+            <a:avLst/>
+          </a:prstGeom>
+          <a:solidFill>
+            <a:schemeClr val="bg1"/>
+          </a:solidFill>
+          <a:ln>
+            <a:solidFill>
+              <a:schemeClr val="tx1"/>
+            </a:solidFill>
+          </a:ln>
+        </p:spPr>
+        <p:txBody>
+          <a:bodyPr wrap="square" rtlCol="0">
+            <a:spAutoFit/>
+          </a:bodyPr>
+          <a:lstStyle/>
+          <a:p>
+            <a:pPr algn="just"/>
+            <a:r>
+              <a:rPr lang="en-US" dirty="0">
+                <a:latin typeface="+mj-lt"/>
+              </a:rPr>
+              <a:t>3x3 and 3X1 Mechblocks (total height of 51mm) would be attached to two ½ inch thick bread boards. One of them is cut to the emulate the dimensions of the tool platform. spacing needed</a:t>
+            </a:r>
+          </a:p>
+        </p:txBody>
+      </p:sp>
+      <p:sp>
+        <p:nvSpPr>
+          <p:cNvPr id="7" name="TextBox 6">
+            <a:extLst>
+              <a:ext uri="{FF2B5EF4-FFF2-40B4-BE49-F238E27FC236}">
+                <a16:creationId xmlns:a16="http://schemas.microsoft.com/office/drawing/2014/main" xmlns="" id="{A397CB86-606F-466D-A589-DD7BA038EED1}"/>
+              </a:ext>
+            </a:extLst>
+          </p:cNvPr>
+          <p:cNvSpPr txBox="1"/>
+          <p:nvPr/>
+        </p:nvSpPr>
+        <p:spPr>
+          <a:xfrm>
+            <a:off x="4889989" y="2948793"/>
+            <a:ext cx="3026611" cy="1569660"/>
+          </a:xfrm>
+          <a:prstGeom prst="rect">
+            <a:avLst/>
+          </a:prstGeom>
+          <a:solidFill>
+            <a:schemeClr val="bg1"/>
+          </a:solidFill>
+          <a:ln>
+            <a:solidFill>
+              <a:schemeClr val="tx1"/>
+            </a:solidFill>
+          </a:ln>
+        </p:spPr>
+        <p:txBody>
+          <a:bodyPr wrap="square" rtlCol="0">
+            <a:spAutoFit/>
+          </a:bodyPr>
+          <a:lstStyle/>
+          <a:p>
+            <a:pPr algn="just"/>
+            <a:r>
+              <a:rPr lang="en-US" sz="2400" dirty="0" smtClean="0">
+                <a:latin typeface="+mj-lt"/>
+              </a:rPr>
+              <a:t>3 sets of blocks will be sufficient but if you need more please add as you need</a:t>
+            </a:r>
+            <a:endParaRPr lang="en-US" sz="2400" b="1" dirty="0">
+              <a:latin typeface="+mj-lt"/>
+            </a:endParaRPr>
+          </a:p>
+        </p:txBody>
+      </p:sp>
+      <p:sp>
+        <p:nvSpPr>
           <p:cNvPr id="3" name="Up-Down Arrow 2"/>
           <p:cNvSpPr/>
           <p:nvPr/>
         </p:nvSpPr>
         <p:spPr>
-          <a:xfrm>
-            <a:off x="7825339" y="1848049"/>
-            <a:ext cx="503882" cy="1568919"/>
+          <a:xfrm rot="2187261">
+            <a:off x="2316077" y="1452970"/>
+            <a:ext cx="484632" cy="1035146"/>
           </a:xfrm>
           <a:prstGeom prst="upDownArrow">
             <a:avLst/>
@@ -4061,32 +4709,30 @@
           <a:lstStyle/>
           <a:p>
             <a:pPr algn="ctr"/>
-            <a:endParaRPr lang="en-US" dirty="0"/>
-          </a:p>
-        </p:txBody>
-      </p:sp>
-      <p:sp>
-        <p:nvSpPr>
-          <p:cNvPr id="4" name="TextBox 3"/>
+            <a:endParaRPr lang="en-US"/>
+          </a:p>
+        </p:txBody>
+      </p:sp>
+      <p:sp>
+        <p:nvSpPr>
+          <p:cNvPr id="9" name="TextBox 8"/>
           <p:cNvSpPr txBox="1"/>
           <p:nvPr/>
         </p:nvSpPr>
         <p:spPr>
           <a:xfrm>
-            <a:off x="9028497" y="1135781"/>
-            <a:ext cx="840295" cy="369332"/>
+            <a:off x="1319514" y="1377387"/>
+            <a:ext cx="1079142" cy="369332"/>
           </a:xfrm>
           <a:prstGeom prst="rect">
             <a:avLst/>
           </a:prstGeom>
           <a:solidFill>
-            <a:schemeClr val="accent1"/>
+            <a:schemeClr val="bg1"/>
           </a:solidFill>
           <a:ln>
             <a:solidFill>
-              <a:schemeClr val="accent1">
-                <a:shade val="50000"/>
-              </a:schemeClr>
+              <a:schemeClr val="accent1"/>
             </a:solidFill>
           </a:ln>
         </p:spPr>
@@ -4097,29 +4743,30 @@
           <a:lstStyle/>
           <a:p>
             <a:r>
-              <a:rPr lang="en-US" dirty="0"/>
-              <a:t>51 mm</a:t>
-            </a:r>
+              <a:rPr lang="en-US" dirty="0" smtClean="0"/>
+              <a:t>114.3mm</a:t>
+            </a:r>
+            <a:endParaRPr lang="en-US" dirty="0"/>
           </a:p>
         </p:txBody>
       </p:sp>
       <p:cxnSp>
         <p:nvCxnSpPr>
-          <p:cNvPr id="6" name="Straight Arrow Connector 5"/>
+          <p:cNvPr id="12" name="Straight Arrow Connector 11"/>
           <p:cNvCxnSpPr/>
           <p:nvPr/>
         </p:nvCxnSpPr>
         <p:spPr>
-          <a:xfrm flipH="1">
-            <a:off x="8123722" y="1289785"/>
-            <a:ext cx="904775" cy="1068404"/>
+          <a:xfrm>
+            <a:off x="2398656" y="1562053"/>
+            <a:ext cx="207384" cy="358187"/>
           </a:xfrm>
           <a:prstGeom prst="straightConnector1">
             <a:avLst/>
           </a:prstGeom>
-          <a:ln w="19050">
+          <a:ln>
             <a:solidFill>
-              <a:srgbClr val="FF0000"/>
+              <a:schemeClr val="bg1"/>
             </a:solidFill>
             <a:tailEnd type="triangle"/>
           </a:ln>
@@ -4141,186 +4788,14 @@
       </p:cxnSp>
       <p:sp>
         <p:nvSpPr>
-          <p:cNvPr id="7" name="TextBox 6"/>
-          <p:cNvSpPr txBox="1"/>
-          <p:nvPr/>
-        </p:nvSpPr>
-        <p:spPr>
-          <a:xfrm>
-            <a:off x="794919" y="4252580"/>
-            <a:ext cx="3093687" cy="1754326"/>
-          </a:xfrm>
-          <a:prstGeom prst="rect">
-            <a:avLst/>
-          </a:prstGeom>
-          <a:solidFill>
-            <a:schemeClr val="bg1"/>
-          </a:solidFill>
-        </p:spPr>
-        <p:txBody>
-          <a:bodyPr wrap="square" rtlCol="0">
-            <a:spAutoFit/>
-          </a:bodyPr>
-          <a:lstStyle/>
-          <a:p>
-            <a:r>
-              <a:rPr lang="en-US" dirty="0"/>
-              <a:t>Make a temporary structure to support your Z axis Scribing head, that emulates this height dimension. it can be made from </a:t>
-            </a:r>
-            <a:r>
-              <a:rPr lang="en-US" dirty="0" err="1"/>
-              <a:t>Mech</a:t>
-            </a:r>
-            <a:r>
-              <a:rPr lang="en-US" dirty="0"/>
-              <a:t> blocks or from other materials </a:t>
-            </a:r>
-          </a:p>
-        </p:txBody>
-      </p:sp>
-      <p:cxnSp>
-        <p:nvCxnSpPr>
-          <p:cNvPr id="9" name="Straight Arrow Connector 8"/>
-          <p:cNvCxnSpPr>
-            <a:endCxn id="3" idx="6"/>
-          </p:cNvCxnSpPr>
-          <p:nvPr/>
-        </p:nvCxnSpPr>
-        <p:spPr>
-          <a:xfrm flipV="1">
-            <a:off x="3927107" y="2632509"/>
-            <a:ext cx="4276144" cy="2507382"/>
-          </a:xfrm>
-          <a:prstGeom prst="straightConnector1">
-            <a:avLst/>
-          </a:prstGeom>
-          <a:ln w="44450">
-            <a:solidFill>
-              <a:srgbClr val="FF0000"/>
-            </a:solidFill>
-            <a:tailEnd type="triangle"/>
-          </a:ln>
-        </p:spPr>
-        <p:style>
-          <a:lnRef idx="1">
-            <a:schemeClr val="accent1"/>
-          </a:lnRef>
-          <a:fillRef idx="0">
-            <a:schemeClr val="accent1"/>
-          </a:fillRef>
-          <a:effectRef idx="0">
-            <a:schemeClr val="accent1"/>
-          </a:effectRef>
-          <a:fontRef idx="minor">
-            <a:schemeClr val="tx1"/>
-          </a:fontRef>
-        </p:style>
-      </p:cxnSp>
-      <p:sp>
-        <p:nvSpPr>
-          <p:cNvPr id="5" name="Date Placeholder 4">
-            <a:extLst>
-              <a:ext uri="{FF2B5EF4-FFF2-40B4-BE49-F238E27FC236}">
-                <a16:creationId xmlns:a16="http://schemas.microsoft.com/office/drawing/2014/main" id="{5F8A9FDB-A68D-4383-B7E3-A5EBB9E210C8}"/>
-              </a:ext>
-            </a:extLst>
-          </p:cNvPr>
-          <p:cNvSpPr>
-            <a:spLocks noGrp="1"/>
-          </p:cNvSpPr>
-          <p:nvPr>
-            <p:ph type="dt" sz="half" idx="10"/>
-          </p:nvPr>
-        </p:nvSpPr>
-        <p:spPr/>
-        <p:txBody>
-          <a:bodyPr/>
-          <a:lstStyle/>
-          <a:p>
-            <a:fld id="{41F944AB-1521-40B9-8458-39C9D80A03E1}" type="datetime1">
-              <a:rPr lang="en-US" b="1">
-                <a:solidFill>
-                  <a:srgbClr val="FF0000"/>
-                </a:solidFill>
-              </a:rPr>
-              <a:pPr/>
-              <a:t>8/21/2020</a:t>
-            </a:fld>
-            <a:r>
-              <a:rPr lang="en-US" b="1" dirty="0">
-                <a:solidFill>
-                  <a:srgbClr val="FF0000"/>
-                </a:solidFill>
-              </a:rPr>
-              <a:t>   PRELIMINARY</a:t>
-            </a:r>
-          </a:p>
-        </p:txBody>
-      </p:sp>
-    </p:spTree>
-    <p:extLst>
-      <p:ext uri="{BB962C8B-B14F-4D97-AF65-F5344CB8AC3E}">
-        <p14:creationId xmlns:p14="http://schemas.microsoft.com/office/powerpoint/2010/main" val="3395956091"/>
-      </p:ext>
-    </p:extLst>
-  </p:cSld>
-  <p:clrMapOvr>
-    <a:masterClrMapping/>
-  </p:clrMapOvr>
-</p:sld>
-</file>
-
-<file path=ppt/slides/slide6.xml><?xml version="1.0" encoding="utf-8"?>
-<p:sld xmlns:a="http://schemas.openxmlformats.org/drawingml/2006/main" xmlns:r="http://schemas.openxmlformats.org/officeDocument/2006/relationships" xmlns:p="http://schemas.openxmlformats.org/presentationml/2006/main">
-  <p:cSld>
-    <p:spTree>
-      <p:nvGrpSpPr>
-        <p:cNvPr id="1" name=""/>
-        <p:cNvGrpSpPr/>
-        <p:nvPr/>
-      </p:nvGrpSpPr>
-      <p:grpSpPr>
-        <a:xfrm>
-          <a:off x="0" y="0"/>
-          <a:ext cx="0" cy="0"/>
-          <a:chOff x="0" y="0"/>
-          <a:chExt cx="0" cy="0"/>
-        </a:xfrm>
-      </p:grpSpPr>
-      <p:pic>
-        <p:nvPicPr>
-          <p:cNvPr id="2" name="Picture 1"/>
-          <p:cNvPicPr>
-            <a:picLocks noChangeAspect="1"/>
-          </p:cNvPicPr>
-          <p:nvPr/>
-        </p:nvPicPr>
-        <p:blipFill>
-          <a:blip r:embed="rId2"/>
-          <a:stretch>
-            <a:fillRect/>
-          </a:stretch>
-        </p:blipFill>
-        <p:spPr>
-          <a:xfrm>
-            <a:off x="1390650" y="157162"/>
-            <a:ext cx="9410700" cy="6543675"/>
-          </a:xfrm>
-          <a:prstGeom prst="rect">
-            <a:avLst/>
-          </a:prstGeom>
-        </p:spPr>
-      </p:pic>
-      <p:sp>
-        <p:nvSpPr>
-          <p:cNvPr id="3" name="Up-Down Arrow 2"/>
+          <p:cNvPr id="15" name="Up-Down Arrow 14"/>
           <p:cNvSpPr/>
           <p:nvPr/>
         </p:nvSpPr>
         <p:spPr>
-          <a:xfrm>
-            <a:off x="7209321" y="2281187"/>
-            <a:ext cx="417255" cy="2040556"/>
+          <a:xfrm rot="16682195">
+            <a:off x="2940047" y="2181691"/>
+            <a:ext cx="484632" cy="939349"/>
           </a:xfrm>
           <a:prstGeom prst="upDownArrow">
             <a:avLst/>
@@ -4353,54 +4828,14 @@
       </p:sp>
       <p:sp>
         <p:nvSpPr>
-          <p:cNvPr id="4" name="Up-Down Arrow 3"/>
-          <p:cNvSpPr/>
-          <p:nvPr/>
-        </p:nvSpPr>
-        <p:spPr>
-          <a:xfrm rot="5400000">
-            <a:off x="6350989" y="2244370"/>
-            <a:ext cx="484632" cy="3099335"/>
-          </a:xfrm>
-          <a:prstGeom prst="upDownArrow">
-            <a:avLst/>
-          </a:prstGeom>
-        </p:spPr>
-        <p:style>
-          <a:lnRef idx="2">
-            <a:schemeClr val="accent1">
-              <a:shade val="50000"/>
-            </a:schemeClr>
-          </a:lnRef>
-          <a:fillRef idx="1">
-            <a:schemeClr val="accent1"/>
-          </a:fillRef>
-          <a:effectRef idx="0">
-            <a:schemeClr val="accent1"/>
-          </a:effectRef>
-          <a:fontRef idx="minor">
-            <a:schemeClr val="lt1"/>
-          </a:fontRef>
-        </p:style>
-        <p:txBody>
-          <a:bodyPr rtlCol="0" anchor="ctr"/>
-          <a:lstStyle/>
-          <a:p>
-            <a:pPr algn="ctr"/>
-            <a:endParaRPr lang="en-US" dirty="0"/>
-          </a:p>
-        </p:txBody>
-      </p:sp>
-      <p:sp>
-        <p:nvSpPr>
-          <p:cNvPr id="5" name="TextBox 4"/>
+          <p:cNvPr id="16" name="TextBox 15"/>
           <p:cNvSpPr txBox="1"/>
           <p:nvPr/>
         </p:nvSpPr>
         <p:spPr>
           <a:xfrm>
-            <a:off x="8970745" y="4658627"/>
-            <a:ext cx="1132041" cy="369332"/>
+            <a:off x="3298371" y="3193869"/>
+            <a:ext cx="1015021" cy="369332"/>
           </a:xfrm>
           <a:prstGeom prst="rect">
             <a:avLst/>
@@ -4423,31 +4858,30 @@
           <a:lstStyle/>
           <a:p>
             <a:r>
-              <a:rPr lang="en-US" dirty="0"/>
-              <a:t>114.3 mm</a:t>
-            </a:r>
+              <a:rPr lang="en-US" dirty="0" smtClean="0"/>
+              <a:t>74.5 mm</a:t>
+            </a:r>
+            <a:endParaRPr lang="en-US" dirty="0"/>
           </a:p>
         </p:txBody>
       </p:sp>
       <p:cxnSp>
         <p:nvCxnSpPr>
-          <p:cNvPr id="7" name="Straight Arrow Connector 6"/>
-          <p:cNvCxnSpPr>
-            <a:stCxn id="5" idx="0"/>
-          </p:cNvCxnSpPr>
+          <p:cNvPr id="19" name="Straight Arrow Connector 18"/>
+          <p:cNvCxnSpPr/>
           <p:nvPr/>
         </p:nvCxnSpPr>
         <p:spPr>
           <a:xfrm flipH="1" flipV="1">
-            <a:off x="7767587" y="3830855"/>
-            <a:ext cx="1769179" cy="827772"/>
+            <a:off x="3298371" y="2762794"/>
+            <a:ext cx="502920" cy="431075"/>
           </a:xfrm>
           <a:prstGeom prst="straightConnector1">
             <a:avLst/>
           </a:prstGeom>
-          <a:ln w="25400">
+          <a:ln>
             <a:solidFill>
-              <a:srgbClr val="FF0000"/>
+              <a:schemeClr val="bg1"/>
             </a:solidFill>
             <a:tailEnd type="triangle"/>
           </a:ln>
@@ -4467,165 +4901,10 @@
           </a:fontRef>
         </p:style>
       </p:cxnSp>
-      <p:sp>
-        <p:nvSpPr>
-          <p:cNvPr id="8" name="TextBox 7"/>
-          <p:cNvSpPr txBox="1"/>
-          <p:nvPr/>
-        </p:nvSpPr>
-        <p:spPr>
-          <a:xfrm>
-            <a:off x="9865895" y="847023"/>
-            <a:ext cx="1132041" cy="369332"/>
-          </a:xfrm>
-          <a:prstGeom prst="rect">
-            <a:avLst/>
-          </a:prstGeom>
-          <a:solidFill>
-            <a:schemeClr val="bg1"/>
-          </a:solidFill>
-        </p:spPr>
-        <p:txBody>
-          <a:bodyPr wrap="none" rtlCol="0">
-            <a:spAutoFit/>
-          </a:bodyPr>
-          <a:lstStyle/>
-          <a:p>
-            <a:r>
-              <a:rPr lang="en-US" dirty="0"/>
-              <a:t>74.55 mm</a:t>
-            </a:r>
-          </a:p>
-        </p:txBody>
-      </p:sp>
-      <p:cxnSp>
-        <p:nvCxnSpPr>
-          <p:cNvPr id="10" name="Straight Arrow Connector 9"/>
-          <p:cNvCxnSpPr/>
-          <p:nvPr/>
-        </p:nvCxnSpPr>
-        <p:spPr>
-          <a:xfrm flipH="1">
-            <a:off x="7488455" y="1029903"/>
-            <a:ext cx="2377440" cy="1607419"/>
-          </a:xfrm>
-          <a:prstGeom prst="straightConnector1">
-            <a:avLst/>
-          </a:prstGeom>
-          <a:ln w="25400">
-            <a:solidFill>
-              <a:srgbClr val="FF0000"/>
-            </a:solidFill>
-            <a:tailEnd type="triangle"/>
-          </a:ln>
-        </p:spPr>
-        <p:style>
-          <a:lnRef idx="1">
-            <a:schemeClr val="accent1"/>
-          </a:lnRef>
-          <a:fillRef idx="0">
-            <a:schemeClr val="accent1"/>
-          </a:fillRef>
-          <a:effectRef idx="0">
-            <a:schemeClr val="accent1"/>
-          </a:effectRef>
-          <a:fontRef idx="minor">
-            <a:schemeClr val="tx1"/>
-          </a:fontRef>
-        </p:style>
-      </p:cxnSp>
-      <p:sp>
-        <p:nvSpPr>
-          <p:cNvPr id="11" name="TextBox 10"/>
-          <p:cNvSpPr txBox="1"/>
-          <p:nvPr/>
-        </p:nvSpPr>
-        <p:spPr>
-          <a:xfrm>
-            <a:off x="827774" y="1029903"/>
-            <a:ext cx="2502567" cy="2585323"/>
-          </a:xfrm>
-          <a:prstGeom prst="rect">
-            <a:avLst/>
-          </a:prstGeom>
-          <a:solidFill>
-            <a:schemeClr val="bg1"/>
-          </a:solidFill>
-          <a:ln>
-            <a:solidFill>
-              <a:srgbClr val="FF0000"/>
-            </a:solidFill>
-          </a:ln>
-        </p:spPr>
-        <p:txBody>
-          <a:bodyPr wrap="square" rtlCol="0">
-            <a:spAutoFit/>
-          </a:bodyPr>
-          <a:lstStyle/>
-          <a:p>
-            <a:r>
-              <a:rPr lang="en-US" dirty="0"/>
-              <a:t>Make a temporary structure to support your Z axis Scribing head, that emulates these dimensions. it can be made from </a:t>
-            </a:r>
-            <a:r>
-              <a:rPr lang="en-US" dirty="0" err="1"/>
-              <a:t>Mech</a:t>
-            </a:r>
-            <a:r>
-              <a:rPr lang="en-US" dirty="0"/>
-              <a:t> blocks or from other materials </a:t>
-            </a:r>
-          </a:p>
-          <a:p>
-            <a:endParaRPr lang="en-US" dirty="0"/>
-          </a:p>
-        </p:txBody>
-      </p:sp>
-      <p:sp>
-        <p:nvSpPr>
-          <p:cNvPr id="6" name="Date Placeholder 5">
-            <a:extLst>
-              <a:ext uri="{FF2B5EF4-FFF2-40B4-BE49-F238E27FC236}">
-                <a16:creationId xmlns:a16="http://schemas.microsoft.com/office/drawing/2014/main" id="{A21645A3-C3F6-4573-8DF5-B704ECD0239A}"/>
-              </a:ext>
-            </a:extLst>
-          </p:cNvPr>
-          <p:cNvSpPr>
-            <a:spLocks noGrp="1"/>
-          </p:cNvSpPr>
-          <p:nvPr>
-            <p:ph type="dt" sz="half" idx="10"/>
-          </p:nvPr>
-        </p:nvSpPr>
-        <p:spPr/>
-        <p:txBody>
-          <a:bodyPr/>
-          <a:lstStyle/>
-          <a:p>
-            <a:fld id="{41F944AB-1521-40B9-8458-39C9D80A03E1}" type="datetime1">
-              <a:rPr lang="en-US" b="1">
-                <a:solidFill>
-                  <a:srgbClr val="FF0000"/>
-                </a:solidFill>
-              </a:rPr>
-              <a:pPr/>
-              <a:t>8/21/2020</a:t>
-            </a:fld>
-            <a:r>
-              <a:rPr lang="en-US" b="1" dirty="0">
-                <a:solidFill>
-                  <a:srgbClr val="FF0000"/>
-                </a:solidFill>
-              </a:rPr>
-              <a:t>   PRELIMINARY</a:t>
-            </a:r>
-          </a:p>
-        </p:txBody>
-      </p:sp>
     </p:spTree>
     <p:extLst>
       <p:ext uri="{BB962C8B-B14F-4D97-AF65-F5344CB8AC3E}">
-        <p14:creationId xmlns:p14="http://schemas.microsoft.com/office/powerpoint/2010/main" val="4105336983"/>
+        <p14:creationId xmlns:p14="http://schemas.microsoft.com/office/powerpoint/2010/main" val="1385020831"/>
       </p:ext>
     </p:extLst>
   </p:cSld>
@@ -4636,267 +4915,6 @@
 </file>
 
 <file path=ppt/theme/theme1.xml><?xml version="1.0" encoding="utf-8"?>
-<a:theme xmlns:a="http://schemas.openxmlformats.org/drawingml/2006/main" name="Office Theme">
-  <a:themeElements>
-    <a:clrScheme name="Office">
-      <a:dk1>
-        <a:sysClr val="windowText" lastClr="000000"/>
-      </a:dk1>
-      <a:lt1>
-        <a:sysClr val="window" lastClr="FFFFFF"/>
-      </a:lt1>
-      <a:dk2>
-        <a:srgbClr val="44546A"/>
-      </a:dk2>
-      <a:lt2>
-        <a:srgbClr val="E7E6E6"/>
-      </a:lt2>
-      <a:accent1>
-        <a:srgbClr val="5B9BD5"/>
-      </a:accent1>
-      <a:accent2>
-        <a:srgbClr val="ED7D31"/>
-      </a:accent2>
-      <a:accent3>
-        <a:srgbClr val="A5A5A5"/>
-      </a:accent3>
-      <a:accent4>
-        <a:srgbClr val="FFC000"/>
-      </a:accent4>
-      <a:accent5>
-        <a:srgbClr val="4472C4"/>
-      </a:accent5>
-      <a:accent6>
-        <a:srgbClr val="70AD47"/>
-      </a:accent6>
-      <a:hlink>
-        <a:srgbClr val="0563C1"/>
-      </a:hlink>
-      <a:folHlink>
-        <a:srgbClr val="954F72"/>
-      </a:folHlink>
-    </a:clrScheme>
-    <a:fontScheme name="Office">
-      <a:majorFont>
-        <a:latin typeface="Calibri Light" panose="020F0302020204030204"/>
-        <a:ea typeface=""/>
-        <a:cs typeface=""/>
-        <a:font script="Jpan" typeface="ＭＳ Ｐゴシック"/>
-        <a:font script="Hang" typeface="맑은 고딕"/>
-        <a:font script="Hans" typeface="宋体"/>
-        <a:font script="Hant" typeface="新細明體"/>
-        <a:font script="Arab" typeface="Times New Roman"/>
-        <a:font script="Hebr" typeface="Times New Roman"/>
-        <a:font script="Thai" typeface="Angsana New"/>
-        <a:font script="Ethi" typeface="Nyala"/>
-        <a:font script="Beng" typeface="Vrinda"/>
-        <a:font script="Gujr" typeface="Shruti"/>
-        <a:font script="Khmr" typeface="MoolBoran"/>
-        <a:font script="Knda" typeface="Tunga"/>
-        <a:font script="Guru" typeface="Raavi"/>
-        <a:font script="Cans" typeface="Euphemia"/>
-        <a:font script="Cher" typeface="Plantagenet Cherokee"/>
-        <a:font script="Yiii" typeface="Microsoft Yi Baiti"/>
-        <a:font script="Tibt" typeface="Microsoft Himalaya"/>
-        <a:font script="Thaa" typeface="MV Boli"/>
-        <a:font script="Deva" typeface="Mangal"/>
-        <a:font script="Telu" typeface="Gautami"/>
-        <a:font script="Taml" typeface="Latha"/>
-        <a:font script="Syrc" typeface="Estrangelo Edessa"/>
-        <a:font script="Orya" typeface="Kalinga"/>
-        <a:font script="Mlym" typeface="Kartika"/>
-        <a:font script="Laoo" typeface="DokChampa"/>
-        <a:font script="Sinh" typeface="Iskoola Pota"/>
-        <a:font script="Mong" typeface="Mongolian Baiti"/>
-        <a:font script="Viet" typeface="Times New Roman"/>
-        <a:font script="Uigh" typeface="Microsoft Uighur"/>
-        <a:font script="Geor" typeface="Sylfaen"/>
-      </a:majorFont>
-      <a:minorFont>
-        <a:latin typeface="Calibri" panose="020F0502020204030204"/>
-        <a:ea typeface=""/>
-        <a:cs typeface=""/>
-        <a:font script="Jpan" typeface="ＭＳ Ｐゴシック"/>
-        <a:font script="Hang" typeface="맑은 고딕"/>
-        <a:font script="Hans" typeface="宋体"/>
-        <a:font script="Hant" typeface="新細明體"/>
-        <a:font script="Arab" typeface="Arial"/>
-        <a:font script="Hebr" typeface="Arial"/>
-        <a:font script="Thai" typeface="Cordia New"/>
-        <a:font script="Ethi" typeface="Nyala"/>
-        <a:font script="Beng" typeface="Vrinda"/>
-        <a:font script="Gujr" typeface="Shruti"/>
-        <a:font script="Khmr" typeface="DaunPenh"/>
-        <a:font script="Knda" typeface="Tunga"/>
-        <a:font script="Guru" typeface="Raavi"/>
-        <a:font script="Cans" typeface="Euphemia"/>
-        <a:font script="Cher" typeface="Plantagenet Cherokee"/>
-        <a:font script="Yiii" typeface="Microsoft Yi Baiti"/>
-        <a:font script="Tibt" typeface="Microsoft Himalaya"/>
-        <a:font script="Thaa" typeface="MV Boli"/>
-        <a:font script="Deva" typeface="Mangal"/>
-        <a:font script="Telu" typeface="Gautami"/>
-        <a:font script="Taml" typeface="Latha"/>
-        <a:font script="Syrc" typeface="Estrangelo Edessa"/>
-        <a:font script="Orya" typeface="Kalinga"/>
-        <a:font script="Mlym" typeface="Kartika"/>
-        <a:font script="Laoo" typeface="DokChampa"/>
-        <a:font script="Sinh" typeface="Iskoola Pota"/>
-        <a:font script="Mong" typeface="Mongolian Baiti"/>
-        <a:font script="Viet" typeface="Arial"/>
-        <a:font script="Uigh" typeface="Microsoft Uighur"/>
-        <a:font script="Geor" typeface="Sylfaen"/>
-      </a:minorFont>
-    </a:fontScheme>
-    <a:fmtScheme name="Office">
-      <a:fillStyleLst>
-        <a:solidFill>
-          <a:schemeClr val="phClr"/>
-        </a:solidFill>
-        <a:gradFill rotWithShape="1">
-          <a:gsLst>
-            <a:gs pos="0">
-              <a:schemeClr val="phClr">
-                <a:lumMod val="110000"/>
-                <a:satMod val="105000"/>
-                <a:tint val="67000"/>
-              </a:schemeClr>
-            </a:gs>
-            <a:gs pos="50000">
-              <a:schemeClr val="phClr">
-                <a:lumMod val="105000"/>
-                <a:satMod val="103000"/>
-                <a:tint val="73000"/>
-              </a:schemeClr>
-            </a:gs>
-            <a:gs pos="100000">
-              <a:schemeClr val="phClr">
-                <a:lumMod val="105000"/>
-                <a:satMod val="109000"/>
-                <a:tint val="81000"/>
-              </a:schemeClr>
-            </a:gs>
-          </a:gsLst>
-          <a:lin ang="5400000" scaled="0"/>
-        </a:gradFill>
-        <a:gradFill rotWithShape="1">
-          <a:gsLst>
-            <a:gs pos="0">
-              <a:schemeClr val="phClr">
-                <a:satMod val="103000"/>
-                <a:lumMod val="102000"/>
-                <a:tint val="94000"/>
-              </a:schemeClr>
-            </a:gs>
-            <a:gs pos="50000">
-              <a:schemeClr val="phClr">
-                <a:satMod val="110000"/>
-                <a:lumMod val="100000"/>
-                <a:shade val="100000"/>
-              </a:schemeClr>
-            </a:gs>
-            <a:gs pos="100000">
-              <a:schemeClr val="phClr">
-                <a:lumMod val="99000"/>
-                <a:satMod val="120000"/>
-                <a:shade val="78000"/>
-              </a:schemeClr>
-            </a:gs>
-          </a:gsLst>
-          <a:lin ang="5400000" scaled="0"/>
-        </a:gradFill>
-      </a:fillStyleLst>
-      <a:lnStyleLst>
-        <a:ln w="6350" cap="flat" cmpd="sng" algn="ctr">
-          <a:solidFill>
-            <a:schemeClr val="phClr"/>
-          </a:solidFill>
-          <a:prstDash val="solid"/>
-          <a:miter lim="800000"/>
-        </a:ln>
-        <a:ln w="12700" cap="flat" cmpd="sng" algn="ctr">
-          <a:solidFill>
-            <a:schemeClr val="phClr"/>
-          </a:solidFill>
-          <a:prstDash val="solid"/>
-          <a:miter lim="800000"/>
-        </a:ln>
-        <a:ln w="19050" cap="flat" cmpd="sng" algn="ctr">
-          <a:solidFill>
-            <a:schemeClr val="phClr"/>
-          </a:solidFill>
-          <a:prstDash val="solid"/>
-          <a:miter lim="800000"/>
-        </a:ln>
-      </a:lnStyleLst>
-      <a:effectStyleLst>
-        <a:effectStyle>
-          <a:effectLst/>
-        </a:effectStyle>
-        <a:effectStyle>
-          <a:effectLst/>
-        </a:effectStyle>
-        <a:effectStyle>
-          <a:effectLst>
-            <a:outerShdw blurRad="57150" dist="19050" dir="5400000" algn="ctr" rotWithShape="0">
-              <a:srgbClr val="000000">
-                <a:alpha val="63000"/>
-              </a:srgbClr>
-            </a:outerShdw>
-          </a:effectLst>
-        </a:effectStyle>
-      </a:effectStyleLst>
-      <a:bgFillStyleLst>
-        <a:solidFill>
-          <a:schemeClr val="phClr"/>
-        </a:solidFill>
-        <a:solidFill>
-          <a:schemeClr val="phClr">
-            <a:tint val="95000"/>
-            <a:satMod val="170000"/>
-          </a:schemeClr>
-        </a:solidFill>
-        <a:gradFill rotWithShape="1">
-          <a:gsLst>
-            <a:gs pos="0">
-              <a:schemeClr val="phClr">
-                <a:tint val="93000"/>
-                <a:satMod val="150000"/>
-                <a:shade val="98000"/>
-                <a:lumMod val="102000"/>
-              </a:schemeClr>
-            </a:gs>
-            <a:gs pos="50000">
-              <a:schemeClr val="phClr">
-                <a:tint val="98000"/>
-                <a:satMod val="130000"/>
-                <a:shade val="90000"/>
-                <a:lumMod val="103000"/>
-              </a:schemeClr>
-            </a:gs>
-            <a:gs pos="100000">
-              <a:schemeClr val="phClr">
-                <a:shade val="63000"/>
-                <a:satMod val="120000"/>
-              </a:schemeClr>
-            </a:gs>
-          </a:gsLst>
-          <a:lin ang="5400000" scaled="0"/>
-        </a:gradFill>
-      </a:bgFillStyleLst>
-    </a:fmtScheme>
-  </a:themeElements>
-  <a:objectDefaults/>
-  <a:extraClrSchemeLst/>
-  <a:extLst>
-    <a:ext uri="{05A4C25C-085E-4340-85A3-A5531E510DB2}">
-      <thm15:themeFamily xmlns:thm15="http://schemas.microsoft.com/office/thememl/2012/main" name="Office Theme" id="{62F939B6-93AF-4DB8-9C6B-D6C7DFDC589F}" vid="{4A3C46E8-61CC-4603-A589-7422A47A8E4A}"/>
-    </a:ext>
-  </a:extLst>
-</a:theme>
-</file>
-
-<file path=ppt/theme/theme2.xml><?xml version="1.0" encoding="utf-8"?>
 <a:theme xmlns:a="http://schemas.openxmlformats.org/drawingml/2006/main" name="Office Theme">
   <a:themeElements>
     <a:clrScheme name="Office">

</xml_diff>